<commit_message>
Soutenance blanche, projet 2
</commit_message>
<xml_diff>
--- a/projet2/projet2.pptx
+++ b/projet2/projet2.pptx
@@ -10,11 +10,15 @@
     <p:sldId id="257" r:id="rId4"/>
     <p:sldId id="258" r:id="rId5"/>
     <p:sldId id="263" r:id="rId6"/>
-    <p:sldId id="265" r:id="rId7"/>
-    <p:sldId id="264" r:id="rId8"/>
-    <p:sldId id="260" r:id="rId9"/>
-    <p:sldId id="261" r:id="rId10"/>
-    <p:sldId id="262" r:id="rId11"/>
+    <p:sldId id="270" r:id="rId7"/>
+    <p:sldId id="271" r:id="rId8"/>
+    <p:sldId id="265" r:id="rId9"/>
+    <p:sldId id="264" r:id="rId10"/>
+    <p:sldId id="260" r:id="rId11"/>
+    <p:sldId id="261" r:id="rId12"/>
+    <p:sldId id="267" r:id="rId13"/>
+    <p:sldId id="269" r:id="rId14"/>
+    <p:sldId id="262" r:id="rId15"/>
   </p:sldIdLst>
   <p:sldSz cx="12192000" cy="6858000"/>
   <p:notesSz cx="6858000" cy="9144000"/>
@@ -113,6 +117,11 @@
       </a:defRPr>
     </a:lvl9pPr>
   </p:defaultTextStyle>
+  <p:extLst>
+    <p:ext uri="{EFAFB233-063F-42B5-8137-9DF3F51BA10A}">
+      <p15:sldGuideLst xmlns:p15="http://schemas.microsoft.com/office/powerpoint/2012/main"/>
+    </p:ext>
+  </p:extLst>
 </p:presentation>
 </file>
 
@@ -120,19 +129,19 @@
 <pc:chgInfo xmlns:a="http://schemas.openxmlformats.org/drawingml/2006/main" xmlns:r="http://schemas.openxmlformats.org/officeDocument/2006/relationships" xmlns:ac="http://schemas.microsoft.com/office/drawing/2013/main/command" xmlns:pc="http://schemas.microsoft.com/office/powerpoint/2013/main/command">
   <pc:docChgLst>
     <pc:chgData name="Christophe Lebrun" userId="303fc86cbab77272" providerId="LiveId" clId="{D1325364-67D4-4734-844B-AF2494D30FFC}"/>
-    <pc:docChg chg="undo custSel addSld modSld sldOrd">
-      <pc:chgData name="Christophe Lebrun" userId="303fc86cbab77272" providerId="LiveId" clId="{D1325364-67D4-4734-844B-AF2494D30FFC}" dt="2019-06-10T17:10:46.240" v="760" actId="113"/>
+    <pc:docChg chg="undo custSel addSld delSld modSld sldOrd">
+      <pc:chgData name="Christophe Lebrun" userId="303fc86cbab77272" providerId="LiveId" clId="{D1325364-67D4-4734-844B-AF2494D30FFC}" dt="2019-06-26T12:52:00.403" v="4325" actId="20577"/>
       <pc:docMkLst>
         <pc:docMk/>
       </pc:docMkLst>
       <pc:sldChg chg="addSp modSp add">
-        <pc:chgData name="Christophe Lebrun" userId="303fc86cbab77272" providerId="LiveId" clId="{D1325364-67D4-4734-844B-AF2494D30FFC}" dt="2019-06-10T16:46:34.503" v="362" actId="14100"/>
+        <pc:chgData name="Christophe Lebrun" userId="303fc86cbab77272" providerId="LiveId" clId="{D1325364-67D4-4734-844B-AF2494D30FFC}" dt="2019-06-26T07:45:19.817" v="1625" actId="1076"/>
         <pc:sldMkLst>
           <pc:docMk/>
           <pc:sldMk cId="1531447886" sldId="256"/>
         </pc:sldMkLst>
         <pc:spChg chg="mod">
-          <ac:chgData name="Christophe Lebrun" userId="303fc86cbab77272" providerId="LiveId" clId="{D1325364-67D4-4734-844B-AF2494D30FFC}" dt="2019-06-10T16:26:44.809" v="172" actId="1076"/>
+          <ac:chgData name="Christophe Lebrun" userId="303fc86cbab77272" providerId="LiveId" clId="{D1325364-67D4-4734-844B-AF2494D30FFC}" dt="2019-06-26T07:44:32.275" v="1611" actId="1076"/>
           <ac:spMkLst>
             <pc:docMk/>
             <pc:sldMk cId="1531447886" sldId="256"/>
@@ -140,11 +149,19 @@
           </ac:spMkLst>
         </pc:spChg>
         <pc:spChg chg="mod">
-          <ac:chgData name="Christophe Lebrun" userId="303fc86cbab77272" providerId="LiveId" clId="{D1325364-67D4-4734-844B-AF2494D30FFC}" dt="2019-06-10T16:46:34.503" v="362" actId="14100"/>
+          <ac:chgData name="Christophe Lebrun" userId="303fc86cbab77272" providerId="LiveId" clId="{D1325364-67D4-4734-844B-AF2494D30FFC}" dt="2019-06-26T07:45:19.817" v="1625" actId="1076"/>
           <ac:spMkLst>
             <pc:docMk/>
             <pc:sldMk cId="1531447886" sldId="256"/>
             <ac:spMk id="3" creationId="{34D75187-D88F-4F53-B18A-EE11258D12A0}"/>
+          </ac:spMkLst>
+        </pc:spChg>
+        <pc:spChg chg="add mod">
+          <ac:chgData name="Christophe Lebrun" userId="303fc86cbab77272" providerId="LiveId" clId="{D1325364-67D4-4734-844B-AF2494D30FFC}" dt="2019-06-26T07:44:57.187" v="1622" actId="1076"/>
+          <ac:spMkLst>
+            <pc:docMk/>
+            <pc:sldMk cId="1531447886" sldId="256"/>
+            <ac:spMk id="4" creationId="{9C646D9E-13BE-45F2-B603-936E1E00092D}"/>
           </ac:spMkLst>
         </pc:spChg>
         <pc:picChg chg="add mod">
@@ -180,7 +197,7 @@
         </pc:spChg>
       </pc:sldChg>
       <pc:sldChg chg="addSp delSp modSp add">
-        <pc:chgData name="Christophe Lebrun" userId="303fc86cbab77272" providerId="LiveId" clId="{D1325364-67D4-4734-844B-AF2494D30FFC}" dt="2019-06-10T17:10:46.240" v="760" actId="113"/>
+        <pc:chgData name="Christophe Lebrun" userId="303fc86cbab77272" providerId="LiveId" clId="{D1325364-67D4-4734-844B-AF2494D30FFC}" dt="2019-06-25T13:02:05.843" v="1522" actId="6549"/>
         <pc:sldMkLst>
           <pc:docMk/>
           <pc:sldMk cId="621091621" sldId="258"/>
@@ -194,7 +211,7 @@
           </ac:spMkLst>
         </pc:spChg>
         <pc:spChg chg="mod">
-          <ac:chgData name="Christophe Lebrun" userId="303fc86cbab77272" providerId="LiveId" clId="{D1325364-67D4-4734-844B-AF2494D30FFC}" dt="2019-06-10T17:10:46.240" v="760" actId="113"/>
+          <ac:chgData name="Christophe Lebrun" userId="303fc86cbab77272" providerId="LiveId" clId="{D1325364-67D4-4734-844B-AF2494D30FFC}" dt="2019-06-25T13:02:05.843" v="1522" actId="6549"/>
           <ac:spMkLst>
             <pc:docMk/>
             <pc:sldMk cId="621091621" sldId="258"/>
@@ -241,8 +258,8 @@
           </ac:spMkLst>
         </pc:spChg>
       </pc:sldChg>
-      <pc:sldChg chg="modSp add ord">
-        <pc:chgData name="Christophe Lebrun" userId="303fc86cbab77272" providerId="LiveId" clId="{D1325364-67D4-4734-844B-AF2494D30FFC}" dt="2019-06-10T17:01:32.534" v="640" actId="113"/>
+      <pc:sldChg chg="addSp modSp add ord">
+        <pc:chgData name="Christophe Lebrun" userId="303fc86cbab77272" providerId="LiveId" clId="{D1325364-67D4-4734-844B-AF2494D30FFC}" dt="2019-06-26T11:59:06.597" v="2836" actId="1076"/>
         <pc:sldMkLst>
           <pc:docMk/>
           <pc:sldMk cId="3303506237" sldId="260"/>
@@ -261,6 +278,14 @@
             <pc:docMk/>
             <pc:sldMk cId="3303506237" sldId="260"/>
             <ac:spMk id="3" creationId="{C1CD7A5C-6044-4F77-841E-E28AF461363D}"/>
+          </ac:spMkLst>
+        </pc:spChg>
+        <pc:spChg chg="add mod">
+          <ac:chgData name="Christophe Lebrun" userId="303fc86cbab77272" providerId="LiveId" clId="{D1325364-67D4-4734-844B-AF2494D30FFC}" dt="2019-06-26T11:59:06.597" v="2836" actId="1076"/>
+          <ac:spMkLst>
+            <pc:docMk/>
+            <pc:sldMk cId="3303506237" sldId="260"/>
+            <ac:spMk id="4" creationId="{DCE2B66C-CBE3-4153-A49D-FBE1F5B91DAA}"/>
           </ac:spMkLst>
         </pc:spChg>
       </pc:sldChg>
@@ -349,7 +374,7 @@
         </pc:spChg>
       </pc:sldChg>
       <pc:sldChg chg="addSp modSp add">
-        <pc:chgData name="Christophe Lebrun" userId="303fc86cbab77272" providerId="LiveId" clId="{D1325364-67D4-4734-844B-AF2494D30FFC}" dt="2019-06-10T17:08:03.548" v="754" actId="20577"/>
+        <pc:chgData name="Christophe Lebrun" userId="303fc86cbab77272" providerId="LiveId" clId="{D1325364-67D4-4734-844B-AF2494D30FFC}" dt="2019-06-26T11:50:23.298" v="2248" actId="113"/>
         <pc:sldMkLst>
           <pc:docMk/>
           <pc:sldMk cId="2545069334" sldId="265"/>
@@ -363,7 +388,7 @@
           </ac:spMkLst>
         </pc:spChg>
         <pc:spChg chg="mod">
-          <ac:chgData name="Christophe Lebrun" userId="303fc86cbab77272" providerId="LiveId" clId="{D1325364-67D4-4734-844B-AF2494D30FFC}" dt="2019-06-10T17:07:40.835" v="741" actId="1076"/>
+          <ac:chgData name="Christophe Lebrun" userId="303fc86cbab77272" providerId="LiveId" clId="{D1325364-67D4-4734-844B-AF2494D30FFC}" dt="2019-06-26T11:50:08.079" v="2246" actId="20577"/>
           <ac:spMkLst>
             <pc:docMk/>
             <pc:sldMk cId="2545069334" sldId="265"/>
@@ -371,11 +396,189 @@
           </ac:spMkLst>
         </pc:spChg>
         <pc:spChg chg="add mod">
-          <ac:chgData name="Christophe Lebrun" userId="303fc86cbab77272" providerId="LiveId" clId="{D1325364-67D4-4734-844B-AF2494D30FFC}" dt="2019-06-10T17:08:03.548" v="754" actId="20577"/>
+          <ac:chgData name="Christophe Lebrun" userId="303fc86cbab77272" providerId="LiveId" clId="{D1325364-67D4-4734-844B-AF2494D30FFC}" dt="2019-06-26T11:50:23.298" v="2248" actId="113"/>
           <ac:spMkLst>
             <pc:docMk/>
             <pc:sldMk cId="2545069334" sldId="265"/>
             <ac:spMk id="4" creationId="{A703721A-3000-423A-A0D3-E5571F9A6E20}"/>
+          </ac:spMkLst>
+        </pc:spChg>
+      </pc:sldChg>
+      <pc:sldChg chg="add del">
+        <pc:chgData name="Christophe Lebrun" userId="303fc86cbab77272" providerId="LiveId" clId="{D1325364-67D4-4734-844B-AF2494D30FFC}" dt="2019-06-25T09:20:53.645" v="773" actId="2696"/>
+        <pc:sldMkLst>
+          <pc:docMk/>
+          <pc:sldMk cId="1431827167" sldId="266"/>
+        </pc:sldMkLst>
+      </pc:sldChg>
+      <pc:sldChg chg="addSp delSp modSp add ord">
+        <pc:chgData name="Christophe Lebrun" userId="303fc86cbab77272" providerId="LiveId" clId="{D1325364-67D4-4734-844B-AF2494D30FFC}" dt="2019-06-26T11:51:20.649" v="2293" actId="1076"/>
+        <pc:sldMkLst>
+          <pc:docMk/>
+          <pc:sldMk cId="2428231970" sldId="267"/>
+        </pc:sldMkLst>
+        <pc:spChg chg="mod">
+          <ac:chgData name="Christophe Lebrun" userId="303fc86cbab77272" providerId="LiveId" clId="{D1325364-67D4-4734-844B-AF2494D30FFC}" dt="2019-06-26T07:45:36.750" v="1626" actId="1076"/>
+          <ac:spMkLst>
+            <pc:docMk/>
+            <pc:sldMk cId="2428231970" sldId="267"/>
+            <ac:spMk id="2" creationId="{5C719FEB-2FB5-4D1E-BE30-35054F234634}"/>
+          </ac:spMkLst>
+        </pc:spChg>
+        <pc:spChg chg="mod">
+          <ac:chgData name="Christophe Lebrun" userId="303fc86cbab77272" providerId="LiveId" clId="{D1325364-67D4-4734-844B-AF2494D30FFC}" dt="2019-06-26T11:51:20.649" v="2293" actId="1076"/>
+          <ac:spMkLst>
+            <pc:docMk/>
+            <pc:sldMk cId="2428231970" sldId="267"/>
+            <ac:spMk id="3" creationId="{D2C3FDCF-D817-48FF-B885-6596EABAB927}"/>
+          </ac:spMkLst>
+        </pc:spChg>
+        <pc:spChg chg="add del">
+          <ac:chgData name="Christophe Lebrun" userId="303fc86cbab77272" providerId="LiveId" clId="{D1325364-67D4-4734-844B-AF2494D30FFC}" dt="2019-06-25T09:22:49.064" v="856"/>
+          <ac:spMkLst>
+            <pc:docMk/>
+            <pc:sldMk cId="2428231970" sldId="267"/>
+            <ac:spMk id="4" creationId="{199C2F41-0C2F-4929-8300-42617A9DC339}"/>
+          </ac:spMkLst>
+        </pc:spChg>
+        <pc:spChg chg="add del">
+          <ac:chgData name="Christophe Lebrun" userId="303fc86cbab77272" providerId="LiveId" clId="{D1325364-67D4-4734-844B-AF2494D30FFC}" dt="2019-06-25T09:22:48.579" v="855"/>
+          <ac:spMkLst>
+            <pc:docMk/>
+            <pc:sldMk cId="2428231970" sldId="267"/>
+            <ac:spMk id="5" creationId="{B357DFD6-DF15-445F-885E-95A78FEDE1F7}"/>
+          </ac:spMkLst>
+        </pc:spChg>
+        <pc:spChg chg="add del">
+          <ac:chgData name="Christophe Lebrun" userId="303fc86cbab77272" providerId="LiveId" clId="{D1325364-67D4-4734-844B-AF2494D30FFC}" dt="2019-06-25T09:22:58.316" v="859"/>
+          <ac:spMkLst>
+            <pc:docMk/>
+            <pc:sldMk cId="2428231970" sldId="267"/>
+            <ac:spMk id="6" creationId="{CC83155F-0770-4607-8930-C5BCECA5F040}"/>
+          </ac:spMkLst>
+        </pc:spChg>
+        <pc:spChg chg="add del">
+          <ac:chgData name="Christophe Lebrun" userId="303fc86cbab77272" providerId="LiveId" clId="{D1325364-67D4-4734-844B-AF2494D30FFC}" dt="2019-06-25T09:28:28.870" v="1266"/>
+          <ac:spMkLst>
+            <pc:docMk/>
+            <pc:sldMk cId="2428231970" sldId="267"/>
+            <ac:spMk id="7" creationId="{FB8A2A98-EDCF-4D08-8C0A-CCB03CFAB612}"/>
+          </ac:spMkLst>
+        </pc:spChg>
+      </pc:sldChg>
+      <pc:sldChg chg="addSp delSp modSp add del">
+        <pc:chgData name="Christophe Lebrun" userId="303fc86cbab77272" providerId="LiveId" clId="{D1325364-67D4-4734-844B-AF2494D30FFC}" dt="2019-06-26T11:59:19.287" v="2837" actId="2696"/>
+        <pc:sldMkLst>
+          <pc:docMk/>
+          <pc:sldMk cId="2362016884" sldId="268"/>
+        </pc:sldMkLst>
+        <pc:spChg chg="del mod">
+          <ac:chgData name="Christophe Lebrun" userId="303fc86cbab77272" providerId="LiveId" clId="{D1325364-67D4-4734-844B-AF2494D30FFC}" dt="2019-06-26T11:58:55.664" v="2834"/>
+          <ac:spMkLst>
+            <pc:docMk/>
+            <pc:sldMk cId="2362016884" sldId="268"/>
+            <ac:spMk id="3" creationId="{D913AAA6-DD68-432A-A023-0C4220DC6261}"/>
+          </ac:spMkLst>
+        </pc:spChg>
+        <pc:spChg chg="add mod">
+          <ac:chgData name="Christophe Lebrun" userId="303fc86cbab77272" providerId="LiveId" clId="{D1325364-67D4-4734-844B-AF2494D30FFC}" dt="2019-06-26T11:58:55.664" v="2834"/>
+          <ac:spMkLst>
+            <pc:docMk/>
+            <pc:sldMk cId="2362016884" sldId="268"/>
+            <ac:spMk id="4" creationId="{BCE922C8-72A1-46AF-9D73-33920E68EDA9}"/>
+          </ac:spMkLst>
+        </pc:spChg>
+      </pc:sldChg>
+      <pc:sldChg chg="modSp add">
+        <pc:chgData name="Christophe Lebrun" userId="303fc86cbab77272" providerId="LiveId" clId="{D1325364-67D4-4734-844B-AF2494D30FFC}" dt="2019-06-26T12:51:32.743" v="4237" actId="20577"/>
+        <pc:sldMkLst>
+          <pc:docMk/>
+          <pc:sldMk cId="3315547483" sldId="269"/>
+        </pc:sldMkLst>
+        <pc:spChg chg="mod">
+          <ac:chgData name="Christophe Lebrun" userId="303fc86cbab77272" providerId="LiveId" clId="{D1325364-67D4-4734-844B-AF2494D30FFC}" dt="2019-06-26T11:55:53.583" v="2499" actId="1076"/>
+          <ac:spMkLst>
+            <pc:docMk/>
+            <pc:sldMk cId="3315547483" sldId="269"/>
+            <ac:spMk id="2" creationId="{86EA0680-0155-4547-B930-7EB1D5711B4E}"/>
+          </ac:spMkLst>
+        </pc:spChg>
+        <pc:spChg chg="mod">
+          <ac:chgData name="Christophe Lebrun" userId="303fc86cbab77272" providerId="LiveId" clId="{D1325364-67D4-4734-844B-AF2494D30FFC}" dt="2019-06-26T12:51:32.743" v="4237" actId="20577"/>
+          <ac:spMkLst>
+            <pc:docMk/>
+            <pc:sldMk cId="3315547483" sldId="269"/>
+            <ac:spMk id="3" creationId="{844B7975-7EF1-4C09-854E-EAD633CFAA50}"/>
+          </ac:spMkLst>
+        </pc:spChg>
+      </pc:sldChg>
+      <pc:sldChg chg="modSp add">
+        <pc:chgData name="Christophe Lebrun" userId="303fc86cbab77272" providerId="LiveId" clId="{D1325364-67D4-4734-844B-AF2494D30FFC}" dt="2019-06-26T12:16:22.173" v="3746" actId="20577"/>
+        <pc:sldMkLst>
+          <pc:docMk/>
+          <pc:sldMk cId="2768625094" sldId="270"/>
+        </pc:sldMkLst>
+        <pc:spChg chg="mod">
+          <ac:chgData name="Christophe Lebrun" userId="303fc86cbab77272" providerId="LiveId" clId="{D1325364-67D4-4734-844B-AF2494D30FFC}" dt="2019-06-26T12:16:04.226" v="3743" actId="1076"/>
+          <ac:spMkLst>
+            <pc:docMk/>
+            <pc:sldMk cId="2768625094" sldId="270"/>
+            <ac:spMk id="2" creationId="{6BE7C0E1-B149-456E-906F-735B9A14F40C}"/>
+          </ac:spMkLst>
+        </pc:spChg>
+        <pc:spChg chg="mod">
+          <ac:chgData name="Christophe Lebrun" userId="303fc86cbab77272" providerId="LiveId" clId="{D1325364-67D4-4734-844B-AF2494D30FFC}" dt="2019-06-26T12:16:22.173" v="3746" actId="20577"/>
+          <ac:spMkLst>
+            <pc:docMk/>
+            <pc:sldMk cId="2768625094" sldId="270"/>
+            <ac:spMk id="3" creationId="{F308DC2A-B557-4810-A542-B0FB1FAE56B2}"/>
+          </ac:spMkLst>
+        </pc:spChg>
+      </pc:sldChg>
+      <pc:sldChg chg="modSp add">
+        <pc:chgData name="Christophe Lebrun" userId="303fc86cbab77272" providerId="LiveId" clId="{D1325364-67D4-4734-844B-AF2494D30FFC}" dt="2019-06-26T12:52:00.403" v="4325" actId="20577"/>
+        <pc:sldMkLst>
+          <pc:docMk/>
+          <pc:sldMk cId="568591842" sldId="271"/>
+        </pc:sldMkLst>
+        <pc:spChg chg="mod">
+          <ac:chgData name="Christophe Lebrun" userId="303fc86cbab77272" providerId="LiveId" clId="{D1325364-67D4-4734-844B-AF2494D30FFC}" dt="2019-06-26T12:17:05.165" v="3784" actId="20577"/>
+          <ac:spMkLst>
+            <pc:docMk/>
+            <pc:sldMk cId="568591842" sldId="271"/>
+            <ac:spMk id="2" creationId="{D0082922-1F0C-4E00-AECE-AB5985B27F96}"/>
+          </ac:spMkLst>
+        </pc:spChg>
+        <pc:spChg chg="mod">
+          <ac:chgData name="Christophe Lebrun" userId="303fc86cbab77272" providerId="LiveId" clId="{D1325364-67D4-4734-844B-AF2494D30FFC}" dt="2019-06-26T12:52:00.403" v="4325" actId="20577"/>
+          <ac:spMkLst>
+            <pc:docMk/>
+            <pc:sldMk cId="568591842" sldId="271"/>
+            <ac:spMk id="3" creationId="{DEF746C3-1EC2-49F3-91E7-B616CB6E6E73}"/>
+          </ac:spMkLst>
+        </pc:spChg>
+      </pc:sldChg>
+    </pc:docChg>
+  </pc:docChgLst>
+  <pc:docChgLst>
+    <pc:chgData name="Christophe Lebrun" userId="303fc86cbab77272" providerId="LiveId" clId="{C1140C95-80F2-4D95-94FD-7AADB9B45297}"/>
+    <pc:docChg chg="modSld">
+      <pc:chgData name="Christophe Lebrun" userId="303fc86cbab77272" providerId="LiveId" clId="{C1140C95-80F2-4D95-94FD-7AADB9B45297}" dt="2019-06-20T21:56:10.991" v="8" actId="20577"/>
+      <pc:docMkLst>
+        <pc:docMk/>
+      </pc:docMkLst>
+      <pc:sldChg chg="modSp">
+        <pc:chgData name="Christophe Lebrun" userId="303fc86cbab77272" providerId="LiveId" clId="{C1140C95-80F2-4D95-94FD-7AADB9B45297}" dt="2019-06-20T21:56:10.991" v="8" actId="20577"/>
+        <pc:sldMkLst>
+          <pc:docMk/>
+          <pc:sldMk cId="2545069334" sldId="265"/>
+        </pc:sldMkLst>
+        <pc:spChg chg="mod">
+          <ac:chgData name="Christophe Lebrun" userId="303fc86cbab77272" providerId="LiveId" clId="{C1140C95-80F2-4D95-94FD-7AADB9B45297}" dt="2019-06-20T21:56:10.991" v="8" actId="20577"/>
+          <ac:spMkLst>
+            <pc:docMk/>
+            <pc:sldMk cId="2545069334" sldId="265"/>
+            <ac:spMk id="3" creationId="{971D3412-8CC1-4F55-A18D-EE0940EC5A9D}"/>
           </ac:spMkLst>
         </pc:spChg>
       </pc:sldChg>
@@ -554,7 +757,7 @@
           <a:p>
             <a:fld id="{84B9F630-F5BB-4C68-A90B-7601F27B3C8E}" type="datetimeFigureOut">
               <a:rPr lang="fr-FR" smtClean="0"/>
-              <a:t>10/06/2019</a:t>
+              <a:t>26/06/2019</a:t>
             </a:fld>
             <a:endParaRPr lang="fr-FR"/>
           </a:p>
@@ -821,7 +1024,7 @@
           <a:p>
             <a:fld id="{84B9F630-F5BB-4C68-A90B-7601F27B3C8E}" type="datetimeFigureOut">
               <a:rPr lang="fr-FR" smtClean="0"/>
-              <a:t>10/06/2019</a:t>
+              <a:t>26/06/2019</a:t>
             </a:fld>
             <a:endParaRPr lang="fr-FR"/>
           </a:p>
@@ -1052,7 +1255,7 @@
           <a:p>
             <a:fld id="{84B9F630-F5BB-4C68-A90B-7601F27B3C8E}" type="datetimeFigureOut">
               <a:rPr lang="fr-FR" smtClean="0"/>
-              <a:t>10/06/2019</a:t>
+              <a:t>26/06/2019</a:t>
             </a:fld>
             <a:endParaRPr lang="fr-FR"/>
           </a:p>
@@ -1362,7 +1565,7 @@
           <a:p>
             <a:fld id="{84B9F630-F5BB-4C68-A90B-7601F27B3C8E}" type="datetimeFigureOut">
               <a:rPr lang="fr-FR" smtClean="0"/>
-              <a:t>10/06/2019</a:t>
+              <a:t>26/06/2019</a:t>
             </a:fld>
             <a:endParaRPr lang="fr-FR"/>
           </a:p>
@@ -1835,7 +2038,7 @@
           <a:p>
             <a:fld id="{84B9F630-F5BB-4C68-A90B-7601F27B3C8E}" type="datetimeFigureOut">
               <a:rPr lang="fr-FR" smtClean="0"/>
-              <a:t>10/06/2019</a:t>
+              <a:t>26/06/2019</a:t>
             </a:fld>
             <a:endParaRPr lang="fr-FR"/>
           </a:p>
@@ -2382,7 +2585,7 @@
           <a:p>
             <a:fld id="{84B9F630-F5BB-4C68-A90B-7601F27B3C8E}" type="datetimeFigureOut">
               <a:rPr lang="fr-FR" smtClean="0"/>
-              <a:t>10/06/2019</a:t>
+              <a:t>26/06/2019</a:t>
             </a:fld>
             <a:endParaRPr lang="fr-FR"/>
           </a:p>
@@ -3156,7 +3359,7 @@
           <a:p>
             <a:fld id="{84B9F630-F5BB-4C68-A90B-7601F27B3C8E}" type="datetimeFigureOut">
               <a:rPr lang="fr-FR" smtClean="0"/>
-              <a:t>10/06/2019</a:t>
+              <a:t>26/06/2019</a:t>
             </a:fld>
             <a:endParaRPr lang="fr-FR"/>
           </a:p>
@@ -3331,7 +3534,7 @@
           <a:p>
             <a:fld id="{84B9F630-F5BB-4C68-A90B-7601F27B3C8E}" type="datetimeFigureOut">
               <a:rPr lang="fr-FR" smtClean="0"/>
-              <a:t>10/06/2019</a:t>
+              <a:t>26/06/2019</a:t>
             </a:fld>
             <a:endParaRPr lang="fr-FR"/>
           </a:p>
@@ -3554,7 +3757,7 @@
           <a:p>
             <a:fld id="{84B9F630-F5BB-4C68-A90B-7601F27B3C8E}" type="datetimeFigureOut">
               <a:rPr lang="fr-FR" smtClean="0"/>
-              <a:t>10/06/2019</a:t>
+              <a:t>26/06/2019</a:t>
             </a:fld>
             <a:endParaRPr lang="fr-FR"/>
           </a:p>
@@ -3734,7 +3937,7 @@
           <a:p>
             <a:fld id="{84B9F630-F5BB-4C68-A90B-7601F27B3C8E}" type="datetimeFigureOut">
               <a:rPr lang="fr-FR" smtClean="0"/>
-              <a:t>10/06/2019</a:t>
+              <a:t>26/06/2019</a:t>
             </a:fld>
             <a:endParaRPr lang="fr-FR"/>
           </a:p>
@@ -4023,7 +4226,7 @@
           <a:p>
             <a:fld id="{84B9F630-F5BB-4C68-A90B-7601F27B3C8E}" type="datetimeFigureOut">
               <a:rPr lang="fr-FR" smtClean="0"/>
-              <a:t>10/06/2019</a:t>
+              <a:t>26/06/2019</a:t>
             </a:fld>
             <a:endParaRPr lang="fr-FR"/>
           </a:p>
@@ -4265,7 +4468,7 @@
           <a:p>
             <a:fld id="{84B9F630-F5BB-4C68-A90B-7601F27B3C8E}" type="datetimeFigureOut">
               <a:rPr lang="fr-FR" smtClean="0"/>
-              <a:t>10/06/2019</a:t>
+              <a:t>26/06/2019</a:t>
             </a:fld>
             <a:endParaRPr lang="fr-FR"/>
           </a:p>
@@ -4644,7 +4847,7 @@
           <a:p>
             <a:fld id="{84B9F630-F5BB-4C68-A90B-7601F27B3C8E}" type="datetimeFigureOut">
               <a:rPr lang="fr-FR" smtClean="0"/>
-              <a:t>10/06/2019</a:t>
+              <a:t>26/06/2019</a:t>
             </a:fld>
             <a:endParaRPr lang="fr-FR"/>
           </a:p>
@@ -4762,7 +4965,7 @@
           <a:p>
             <a:fld id="{84B9F630-F5BB-4C68-A90B-7601F27B3C8E}" type="datetimeFigureOut">
               <a:rPr lang="fr-FR" smtClean="0"/>
-              <a:t>10/06/2019</a:t>
+              <a:t>26/06/2019</a:t>
             </a:fld>
             <a:endParaRPr lang="fr-FR"/>
           </a:p>
@@ -4857,7 +5060,7 @@
           <a:p>
             <a:fld id="{84B9F630-F5BB-4C68-A90B-7601F27B3C8E}" type="datetimeFigureOut">
               <a:rPr lang="fr-FR" smtClean="0"/>
-              <a:t>10/06/2019</a:t>
+              <a:t>26/06/2019</a:t>
             </a:fld>
             <a:endParaRPr lang="fr-FR"/>
           </a:p>
@@ -5106,7 +5309,7 @@
           <a:p>
             <a:fld id="{84B9F630-F5BB-4C68-A90B-7601F27B3C8E}" type="datetimeFigureOut">
               <a:rPr lang="fr-FR" smtClean="0"/>
-              <a:t>10/06/2019</a:t>
+              <a:t>26/06/2019</a:t>
             </a:fld>
             <a:endParaRPr lang="fr-FR"/>
           </a:p>
@@ -5363,7 +5566,7 @@
           <a:p>
             <a:fld id="{84B9F630-F5BB-4C68-A90B-7601F27B3C8E}" type="datetimeFigureOut">
               <a:rPr lang="fr-FR" smtClean="0"/>
-              <a:t>10/06/2019</a:t>
+              <a:t>26/06/2019</a:t>
             </a:fld>
             <a:endParaRPr lang="fr-FR"/>
           </a:p>
@@ -5606,7 +5809,7 @@
           <a:p>
             <a:fld id="{84B9F630-F5BB-4C68-A90B-7601F27B3C8E}" type="datetimeFigureOut">
               <a:rPr lang="fr-FR" smtClean="0"/>
-              <a:t>10/06/2019</a:t>
+              <a:t>26/06/2019</a:t>
             </a:fld>
             <a:endParaRPr lang="fr-FR"/>
           </a:p>
@@ -6035,7 +6238,7 @@
         </p:nvSpPr>
         <p:spPr>
           <a:xfrm>
-            <a:off x="877956" y="1778476"/>
+            <a:off x="745434" y="1754656"/>
             <a:ext cx="10436087" cy="1311818"/>
           </a:xfrm>
         </p:spPr>
@@ -6045,6 +6248,9 @@
           </a:bodyPr>
           <a:lstStyle/>
           <a:p>
+            <a:br>
+              <a:rPr lang="fr-FR" sz="4000" dirty="0"/>
+            </a:br>
             <a:r>
               <a:rPr lang="fr-FR" sz="4000" b="1" cap="small" dirty="0"/>
               <a:t>Projet 2 :</a:t>
@@ -6077,8 +6283,8 @@
         </p:nvSpPr>
         <p:spPr>
           <a:xfrm>
-            <a:off x="8587406" y="6056243"/>
-            <a:ext cx="3604594" cy="801757"/>
+            <a:off x="6851374" y="3433472"/>
+            <a:ext cx="5340626" cy="1590262"/>
           </a:xfrm>
         </p:spPr>
         <p:txBody>
@@ -6087,32 +6293,34 @@
           </a:bodyPr>
           <a:lstStyle/>
           <a:p>
+            <a:pPr algn="r"/>
             <a:r>
               <a:rPr lang="fr-FR" b="1" dirty="0"/>
-              <a:t>Christophe LEBRUN </a:t>
-            </a:r>
-          </a:p>
-          <a:p>
+              <a:t>Christophe LEBRUN</a:t>
+            </a:r>
+          </a:p>
+          <a:p>
+            <a:pPr algn="r"/>
+            <a:r>
+              <a:rPr lang="fr-FR" b="1" dirty="0"/>
+              <a:t>Mentor accompagnateur : </a:t>
+            </a:r>
             <a:r>
               <a:rPr lang="fr-FR" dirty="0"/>
-              <a:t>Parcours « </a:t>
-            </a:r>
-            <a:r>
-              <a:rPr lang="fr-FR" i="1" dirty="0"/>
-              <a:t>Data </a:t>
-            </a:r>
-            <a:r>
-              <a:rPr lang="fr-FR" i="1" dirty="0" err="1"/>
-              <a:t>Scientist</a:t>
-            </a:r>
-            <a:r>
-              <a:rPr lang="fr-FR" i="1" dirty="0"/>
-              <a:t> </a:t>
+              <a:t>Thierno Diop</a:t>
+            </a:r>
+          </a:p>
+          <a:p>
+            <a:pPr algn="r"/>
+            <a:r>
+              <a:rPr lang="fr-FR" b="1" dirty="0"/>
+              <a:t>Mentor examinateur : </a:t>
             </a:r>
             <a:r>
               <a:rPr lang="fr-FR" dirty="0"/>
-              <a:t>»</a:t>
-            </a:r>
+              <a:t>Corentin Martel</a:t>
+            </a:r>
+            <a:endParaRPr lang="fr-FR" b="1" dirty="0"/>
           </a:p>
         </p:txBody>
       </p:sp>
@@ -6152,6 +6360,61 @@
           </a:prstGeom>
         </p:spPr>
       </p:pic>
+      <p:sp>
+        <p:nvSpPr>
+          <p:cNvPr id="4" name="ZoneTexte 3">
+            <a:extLst>
+              <a:ext uri="{FF2B5EF4-FFF2-40B4-BE49-F238E27FC236}">
+                <a16:creationId xmlns:a16="http://schemas.microsoft.com/office/drawing/2014/main" id="{9C646D9E-13BE-45F2-B603-936E1E00092D}"/>
+              </a:ext>
+            </a:extLst>
+          </p:cNvPr>
+          <p:cNvSpPr txBox="1"/>
+          <p:nvPr/>
+        </p:nvSpPr>
+        <p:spPr>
+          <a:xfrm>
+            <a:off x="745434" y="1410849"/>
+            <a:ext cx="6662530" cy="523220"/>
+          </a:xfrm>
+          <a:prstGeom prst="rect">
+            <a:avLst/>
+          </a:prstGeom>
+          <a:noFill/>
+        </p:spPr>
+        <p:txBody>
+          <a:bodyPr wrap="square" rtlCol="0">
+            <a:spAutoFit/>
+          </a:bodyPr>
+          <a:lstStyle/>
+          <a:p>
+            <a:r>
+              <a:rPr lang="fr-FR" sz="2800" cap="small" dirty="0">
+                <a:latin typeface="+mj-lt"/>
+                <a:ea typeface="+mj-ea"/>
+                <a:cs typeface="+mj-cs"/>
+              </a:rPr>
+              <a:t>Parcours « Data </a:t>
+            </a:r>
+            <a:r>
+              <a:rPr lang="fr-FR" sz="2800" cap="small" dirty="0" err="1">
+                <a:latin typeface="+mj-lt"/>
+                <a:ea typeface="+mj-ea"/>
+                <a:cs typeface="+mj-cs"/>
+              </a:rPr>
+              <a:t>Scientist</a:t>
+            </a:r>
+            <a:r>
+              <a:rPr lang="fr-FR" sz="2800" cap="small" dirty="0">
+                <a:latin typeface="+mj-lt"/>
+                <a:ea typeface="+mj-ea"/>
+                <a:cs typeface="+mj-cs"/>
+              </a:rPr>
+              <a:t> »</a:t>
+            </a:r>
+          </a:p>
+        </p:txBody>
+      </p:sp>
     </p:spTree>
     <p:extLst>
       <p:ext uri="{BB962C8B-B14F-4D97-AF65-F5344CB8AC3E}">
@@ -6187,6 +6450,809 @@
           <p:cNvPr id="2" name="Titre 1">
             <a:extLst>
               <a:ext uri="{FF2B5EF4-FFF2-40B4-BE49-F238E27FC236}">
+                <a16:creationId xmlns:a16="http://schemas.microsoft.com/office/drawing/2014/main" id="{96885828-B058-4F14-80D3-515FB1B2EA26}"/>
+              </a:ext>
+            </a:extLst>
+          </p:cNvPr>
+          <p:cNvSpPr>
+            <a:spLocks noGrp="1"/>
+          </p:cNvSpPr>
+          <p:nvPr>
+            <p:ph type="title"/>
+          </p:nvPr>
+        </p:nvSpPr>
+        <p:spPr/>
+        <p:txBody>
+          <a:bodyPr/>
+          <a:lstStyle/>
+          <a:p>
+            <a:r>
+              <a:rPr lang="fr-FR" b="1" dirty="0"/>
+              <a:t>Partie 2 :</a:t>
+            </a:r>
+            <a:br>
+              <a:rPr lang="fr-FR" b="1" dirty="0"/>
+            </a:br>
+            <a:r>
+              <a:rPr lang="fr-FR" dirty="0"/>
+              <a:t>Présentation de l’analyse </a:t>
+            </a:r>
+            <a:br>
+              <a:rPr lang="fr-FR" dirty="0"/>
+            </a:br>
+            <a:r>
+              <a:rPr lang="fr-FR" dirty="0"/>
+              <a:t>pré-exploratoire </a:t>
+            </a:r>
+          </a:p>
+        </p:txBody>
+      </p:sp>
+      <p:sp>
+        <p:nvSpPr>
+          <p:cNvPr id="3" name="Espace réservé du texte 2">
+            <a:extLst>
+              <a:ext uri="{FF2B5EF4-FFF2-40B4-BE49-F238E27FC236}">
+                <a16:creationId xmlns:a16="http://schemas.microsoft.com/office/drawing/2014/main" id="{C1CD7A5C-6044-4F77-841E-E28AF461363D}"/>
+              </a:ext>
+            </a:extLst>
+          </p:cNvPr>
+          <p:cNvSpPr>
+            <a:spLocks noGrp="1"/>
+          </p:cNvSpPr>
+          <p:nvPr>
+            <p:ph type="body" idx="1"/>
+          </p:nvPr>
+        </p:nvSpPr>
+        <p:spPr/>
+        <p:txBody>
+          <a:bodyPr/>
+          <a:lstStyle/>
+          <a:p>
+            <a:br>
+              <a:rPr lang="fr-FR" dirty="0"/>
+            </a:br>
+            <a:endParaRPr lang="fr-FR" dirty="0"/>
+          </a:p>
+        </p:txBody>
+      </p:sp>
+      <p:sp>
+        <p:nvSpPr>
+          <p:cNvPr id="4" name="Sous-titre 2">
+            <a:extLst>
+              <a:ext uri="{FF2B5EF4-FFF2-40B4-BE49-F238E27FC236}">
+                <a16:creationId xmlns:a16="http://schemas.microsoft.com/office/drawing/2014/main" id="{DCE2B66C-CBE3-4153-A49D-FBE1F5B91DAA}"/>
+              </a:ext>
+            </a:extLst>
+          </p:cNvPr>
+          <p:cNvSpPr txBox="1">
+            <a:spLocks/>
+          </p:cNvSpPr>
+          <p:nvPr/>
+        </p:nvSpPr>
+        <p:spPr>
+          <a:xfrm>
+            <a:off x="2057399" y="3776662"/>
+            <a:ext cx="9448800" cy="685800"/>
+          </a:xfrm>
+          <a:prstGeom prst="rect">
+            <a:avLst/>
+          </a:prstGeom>
+        </p:spPr>
+        <p:txBody>
+          <a:bodyPr vert="horz" lIns="91440" tIns="45720" rIns="91440" bIns="45720" rtlCol="0">
+            <a:normAutofit/>
+          </a:bodyPr>
+          <a:lstStyle>
+            <a:lvl1pPr marL="0" indent="0" algn="r" defTabSz="914400" rtl="0" eaLnBrk="1" latinLnBrk="0" hangingPunct="1">
+              <a:lnSpc>
+                <a:spcPct val="90000"/>
+              </a:lnSpc>
+              <a:spcBef>
+                <a:spcPts val="1000"/>
+              </a:spcBef>
+              <a:buFont typeface="Arial" panose="020B0604020202020204" pitchFamily="34" charset="0"/>
+              <a:buNone/>
+              <a:defRPr sz="2200" kern="1200">
+                <a:solidFill>
+                  <a:schemeClr val="tx1">
+                    <a:tint val="75000"/>
+                  </a:schemeClr>
+                </a:solidFill>
+                <a:latin typeface="+mn-lt"/>
+                <a:ea typeface="+mn-ea"/>
+                <a:cs typeface="+mn-cs"/>
+              </a:defRPr>
+            </a:lvl1pPr>
+            <a:lvl2pPr marL="457200" indent="0" algn="l" defTabSz="914400" rtl="0" eaLnBrk="1" latinLnBrk="0" hangingPunct="1">
+              <a:lnSpc>
+                <a:spcPct val="90000"/>
+              </a:lnSpc>
+              <a:spcBef>
+                <a:spcPts val="500"/>
+              </a:spcBef>
+              <a:buFont typeface="Arial" panose="020B0604020202020204" pitchFamily="34" charset="0"/>
+              <a:buNone/>
+              <a:defRPr sz="2000" kern="1200">
+                <a:solidFill>
+                  <a:schemeClr val="tx1">
+                    <a:tint val="75000"/>
+                  </a:schemeClr>
+                </a:solidFill>
+                <a:latin typeface="+mn-lt"/>
+                <a:ea typeface="+mn-ea"/>
+                <a:cs typeface="+mn-cs"/>
+              </a:defRPr>
+            </a:lvl2pPr>
+            <a:lvl3pPr marL="914400" indent="0" algn="l" defTabSz="914400" rtl="0" eaLnBrk="1" latinLnBrk="0" hangingPunct="1">
+              <a:lnSpc>
+                <a:spcPct val="90000"/>
+              </a:lnSpc>
+              <a:spcBef>
+                <a:spcPts val="500"/>
+              </a:spcBef>
+              <a:buFont typeface="Arial" panose="020B0604020202020204" pitchFamily="34" charset="0"/>
+              <a:buNone/>
+              <a:defRPr sz="1800" kern="1200">
+                <a:solidFill>
+                  <a:schemeClr val="tx1">
+                    <a:tint val="75000"/>
+                  </a:schemeClr>
+                </a:solidFill>
+                <a:latin typeface="+mn-lt"/>
+                <a:ea typeface="+mn-ea"/>
+                <a:cs typeface="+mn-cs"/>
+              </a:defRPr>
+            </a:lvl3pPr>
+            <a:lvl4pPr marL="1371600" indent="0" algn="l" defTabSz="914400" rtl="0" eaLnBrk="1" latinLnBrk="0" hangingPunct="1">
+              <a:lnSpc>
+                <a:spcPct val="90000"/>
+              </a:lnSpc>
+              <a:spcBef>
+                <a:spcPts val="500"/>
+              </a:spcBef>
+              <a:buFont typeface="Arial" panose="020B0604020202020204" pitchFamily="34" charset="0"/>
+              <a:buNone/>
+              <a:defRPr sz="1600" kern="1200">
+                <a:solidFill>
+                  <a:schemeClr val="tx1">
+                    <a:tint val="75000"/>
+                  </a:schemeClr>
+                </a:solidFill>
+                <a:latin typeface="+mn-lt"/>
+                <a:ea typeface="+mn-ea"/>
+                <a:cs typeface="+mn-cs"/>
+              </a:defRPr>
+            </a:lvl4pPr>
+            <a:lvl5pPr marL="1828800" indent="0" algn="l" defTabSz="914400" rtl="0" eaLnBrk="1" latinLnBrk="0" hangingPunct="1">
+              <a:lnSpc>
+                <a:spcPct val="90000"/>
+              </a:lnSpc>
+              <a:spcBef>
+                <a:spcPts val="500"/>
+              </a:spcBef>
+              <a:buFont typeface="Arial" panose="020B0604020202020204" pitchFamily="34" charset="0"/>
+              <a:buNone/>
+              <a:defRPr sz="1600" kern="1200">
+                <a:solidFill>
+                  <a:schemeClr val="tx1">
+                    <a:tint val="75000"/>
+                  </a:schemeClr>
+                </a:solidFill>
+                <a:latin typeface="+mn-lt"/>
+                <a:ea typeface="+mn-ea"/>
+                <a:cs typeface="+mn-cs"/>
+              </a:defRPr>
+            </a:lvl5pPr>
+            <a:lvl6pPr marL="2286000" indent="0" algn="l" defTabSz="914400" rtl="0" eaLnBrk="1" latinLnBrk="0" hangingPunct="1">
+              <a:lnSpc>
+                <a:spcPct val="90000"/>
+              </a:lnSpc>
+              <a:spcBef>
+                <a:spcPts val="500"/>
+              </a:spcBef>
+              <a:buFont typeface="Arial" panose="020B0604020202020204" pitchFamily="34" charset="0"/>
+              <a:buNone/>
+              <a:defRPr sz="1600" kern="1200">
+                <a:solidFill>
+                  <a:schemeClr val="tx1">
+                    <a:tint val="75000"/>
+                  </a:schemeClr>
+                </a:solidFill>
+                <a:latin typeface="+mn-lt"/>
+                <a:ea typeface="+mn-ea"/>
+                <a:cs typeface="+mn-cs"/>
+              </a:defRPr>
+            </a:lvl6pPr>
+            <a:lvl7pPr marL="2743200" indent="0" algn="l" defTabSz="914400" rtl="0" eaLnBrk="1" latinLnBrk="0" hangingPunct="1">
+              <a:lnSpc>
+                <a:spcPct val="90000"/>
+              </a:lnSpc>
+              <a:spcBef>
+                <a:spcPts val="500"/>
+              </a:spcBef>
+              <a:buFont typeface="Arial" panose="020B0604020202020204" pitchFamily="34" charset="0"/>
+              <a:buNone/>
+              <a:defRPr sz="1600" kern="1200">
+                <a:solidFill>
+                  <a:schemeClr val="tx1">
+                    <a:tint val="75000"/>
+                  </a:schemeClr>
+                </a:solidFill>
+                <a:latin typeface="+mn-lt"/>
+                <a:ea typeface="+mn-ea"/>
+                <a:cs typeface="+mn-cs"/>
+              </a:defRPr>
+            </a:lvl7pPr>
+            <a:lvl8pPr marL="3200400" indent="0" algn="l" defTabSz="914400" rtl="0" eaLnBrk="1" latinLnBrk="0" hangingPunct="1">
+              <a:lnSpc>
+                <a:spcPct val="90000"/>
+              </a:lnSpc>
+              <a:spcBef>
+                <a:spcPts val="500"/>
+              </a:spcBef>
+              <a:buFont typeface="Arial" panose="020B0604020202020204" pitchFamily="34" charset="0"/>
+              <a:buNone/>
+              <a:defRPr sz="1600" kern="1200">
+                <a:solidFill>
+                  <a:schemeClr val="tx1">
+                    <a:tint val="75000"/>
+                  </a:schemeClr>
+                </a:solidFill>
+                <a:latin typeface="+mn-lt"/>
+                <a:ea typeface="+mn-ea"/>
+                <a:cs typeface="+mn-cs"/>
+              </a:defRPr>
+            </a:lvl8pPr>
+            <a:lvl9pPr marL="3657600" indent="0" algn="l" defTabSz="914400" rtl="0" eaLnBrk="1" latinLnBrk="0" hangingPunct="1">
+              <a:lnSpc>
+                <a:spcPct val="90000"/>
+              </a:lnSpc>
+              <a:spcBef>
+                <a:spcPts val="500"/>
+              </a:spcBef>
+              <a:buFont typeface="Arial" panose="020B0604020202020204" pitchFamily="34" charset="0"/>
+              <a:buNone/>
+              <a:defRPr sz="1600" kern="1200">
+                <a:solidFill>
+                  <a:schemeClr val="tx1">
+                    <a:tint val="75000"/>
+                  </a:schemeClr>
+                </a:solidFill>
+                <a:latin typeface="+mn-lt"/>
+                <a:ea typeface="+mn-ea"/>
+                <a:cs typeface="+mn-cs"/>
+              </a:defRPr>
+            </a:lvl9pPr>
+          </a:lstStyle>
+          <a:p>
+            <a:r>
+              <a:rPr lang="fr-FR">
+                <a:hlinkClick r:id="rId2"/>
+              </a:rPr>
+              <a:t>http://localhost:8888/lab</a:t>
+            </a:r>
+            <a:endParaRPr lang="fr-FR" dirty="0"/>
+          </a:p>
+        </p:txBody>
+      </p:sp>
+    </p:spTree>
+    <p:extLst>
+      <p:ext uri="{BB962C8B-B14F-4D97-AF65-F5344CB8AC3E}">
+        <p14:creationId xmlns:p14="http://schemas.microsoft.com/office/powerpoint/2010/main" val="3303506237"/>
+      </p:ext>
+    </p:extLst>
+  </p:cSld>
+  <p:clrMapOvr>
+    <a:masterClrMapping/>
+  </p:clrMapOvr>
+</p:sld>
+</file>
+
+<file path=ppt/slides/slide11.xml><?xml version="1.0" encoding="utf-8"?>
+<p:sld xmlns:a="http://schemas.openxmlformats.org/drawingml/2006/main" xmlns:r="http://schemas.openxmlformats.org/officeDocument/2006/relationships" xmlns:p="http://schemas.openxmlformats.org/presentationml/2006/main">
+  <p:cSld>
+    <p:spTree>
+      <p:nvGrpSpPr>
+        <p:cNvPr id="1" name=""/>
+        <p:cNvGrpSpPr/>
+        <p:nvPr/>
+      </p:nvGrpSpPr>
+      <p:grpSpPr>
+        <a:xfrm>
+          <a:off x="0" y="0"/>
+          <a:ext cx="0" cy="0"/>
+          <a:chOff x="0" y="0"/>
+          <a:chExt cx="0" cy="0"/>
+        </a:xfrm>
+      </p:grpSpPr>
+      <p:sp>
+        <p:nvSpPr>
+          <p:cNvPr id="2" name="Titre 1">
+            <a:extLst>
+              <a:ext uri="{FF2B5EF4-FFF2-40B4-BE49-F238E27FC236}">
+                <a16:creationId xmlns:a16="http://schemas.microsoft.com/office/drawing/2014/main" id="{96885828-B058-4F14-80D3-515FB1B2EA26}"/>
+              </a:ext>
+            </a:extLst>
+          </p:cNvPr>
+          <p:cNvSpPr>
+            <a:spLocks noGrp="1"/>
+          </p:cNvSpPr>
+          <p:nvPr>
+            <p:ph type="title"/>
+          </p:nvPr>
+        </p:nvSpPr>
+        <p:spPr/>
+        <p:txBody>
+          <a:bodyPr/>
+          <a:lstStyle/>
+          <a:p>
+            <a:r>
+              <a:rPr lang="fr-FR" b="1" dirty="0"/>
+              <a:t>conclusions sur la pertinence de l’usage du jeu de données</a:t>
+            </a:r>
+          </a:p>
+        </p:txBody>
+      </p:sp>
+      <p:sp>
+        <p:nvSpPr>
+          <p:cNvPr id="3" name="Espace réservé du texte 2">
+            <a:extLst>
+              <a:ext uri="{FF2B5EF4-FFF2-40B4-BE49-F238E27FC236}">
+                <a16:creationId xmlns:a16="http://schemas.microsoft.com/office/drawing/2014/main" id="{C1CD7A5C-6044-4F77-841E-E28AF461363D}"/>
+              </a:ext>
+            </a:extLst>
+          </p:cNvPr>
+          <p:cNvSpPr>
+            <a:spLocks noGrp="1"/>
+          </p:cNvSpPr>
+          <p:nvPr>
+            <p:ph type="body" idx="1"/>
+          </p:nvPr>
+        </p:nvSpPr>
+        <p:spPr/>
+        <p:txBody>
+          <a:bodyPr/>
+          <a:lstStyle/>
+          <a:p>
+            <a:br>
+              <a:rPr lang="fr-FR" dirty="0"/>
+            </a:br>
+            <a:endParaRPr lang="fr-FR" dirty="0"/>
+          </a:p>
+        </p:txBody>
+      </p:sp>
+    </p:spTree>
+    <p:extLst>
+      <p:ext uri="{BB962C8B-B14F-4D97-AF65-F5344CB8AC3E}">
+        <p14:creationId xmlns:p14="http://schemas.microsoft.com/office/powerpoint/2010/main" val="578457273"/>
+      </p:ext>
+    </p:extLst>
+  </p:cSld>
+  <p:clrMapOvr>
+    <a:masterClrMapping/>
+  </p:clrMapOvr>
+</p:sld>
+</file>
+
+<file path=ppt/slides/slide12.xml><?xml version="1.0" encoding="utf-8"?>
+<p:sld xmlns:a="http://schemas.openxmlformats.org/drawingml/2006/main" xmlns:r="http://schemas.openxmlformats.org/officeDocument/2006/relationships" xmlns:p="http://schemas.openxmlformats.org/presentationml/2006/main">
+  <p:cSld>
+    <p:spTree>
+      <p:nvGrpSpPr>
+        <p:cNvPr id="1" name=""/>
+        <p:cNvGrpSpPr/>
+        <p:nvPr/>
+      </p:nvGrpSpPr>
+      <p:grpSpPr>
+        <a:xfrm>
+          <a:off x="0" y="0"/>
+          <a:ext cx="0" cy="0"/>
+          <a:chOff x="0" y="0"/>
+          <a:chExt cx="0" cy="0"/>
+        </a:xfrm>
+      </p:grpSpPr>
+      <p:sp>
+        <p:nvSpPr>
+          <p:cNvPr id="2" name="Titre 1">
+            <a:extLst>
+              <a:ext uri="{FF2B5EF4-FFF2-40B4-BE49-F238E27FC236}">
+                <a16:creationId xmlns:a16="http://schemas.microsoft.com/office/drawing/2014/main" id="{5C719FEB-2FB5-4D1E-BE30-35054F234634}"/>
+              </a:ext>
+            </a:extLst>
+          </p:cNvPr>
+          <p:cNvSpPr>
+            <a:spLocks noGrp="1"/>
+          </p:cNvSpPr>
+          <p:nvPr>
+            <p:ph type="title"/>
+          </p:nvPr>
+        </p:nvSpPr>
+        <p:spPr>
+          <a:xfrm>
+            <a:off x="2908853" y="428186"/>
+            <a:ext cx="8610600" cy="1293028"/>
+          </a:xfrm>
+        </p:spPr>
+        <p:txBody>
+          <a:bodyPr/>
+          <a:lstStyle/>
+          <a:p>
+            <a:r>
+              <a:rPr lang="fr-FR" dirty="0"/>
+              <a:t>Des indicateurs pertinents</a:t>
+            </a:r>
+          </a:p>
+        </p:txBody>
+      </p:sp>
+      <p:sp>
+        <p:nvSpPr>
+          <p:cNvPr id="3" name="Espace réservé du contenu 2">
+            <a:extLst>
+              <a:ext uri="{FF2B5EF4-FFF2-40B4-BE49-F238E27FC236}">
+                <a16:creationId xmlns:a16="http://schemas.microsoft.com/office/drawing/2014/main" id="{D2C3FDCF-D817-48FF-B885-6596EABAB927}"/>
+              </a:ext>
+            </a:extLst>
+          </p:cNvPr>
+          <p:cNvSpPr>
+            <a:spLocks noGrp="1"/>
+          </p:cNvSpPr>
+          <p:nvPr>
+            <p:ph idx="1"/>
+          </p:nvPr>
+        </p:nvSpPr>
+        <p:spPr>
+          <a:xfrm>
+            <a:off x="176463" y="1813980"/>
+            <a:ext cx="12015537" cy="5419859"/>
+          </a:xfrm>
+        </p:spPr>
+        <p:txBody>
+          <a:bodyPr>
+            <a:normAutofit fontScale="92500" lnSpcReduction="20000"/>
+          </a:bodyPr>
+          <a:lstStyle/>
+          <a:p>
+            <a:r>
+              <a:rPr lang="fr-FR" sz="2800" b="1" dirty="0"/>
+              <a:t>La population et son évolution</a:t>
+            </a:r>
+          </a:p>
+          <a:p>
+            <a:pPr lvl="1"/>
+            <a:r>
+              <a:rPr lang="fr-FR" sz="2800" dirty="0"/>
+              <a:t>SP.POP.TOTL : population totale</a:t>
+            </a:r>
+          </a:p>
+          <a:p>
+            <a:pPr lvl="2"/>
+            <a:r>
+              <a:rPr lang="fr-FR" sz="2600" dirty="0"/>
+              <a:t>SP.SEC.TOTL.IN : population dans le secondaire</a:t>
+            </a:r>
+          </a:p>
+          <a:p>
+            <a:pPr lvl="2"/>
+            <a:r>
+              <a:rPr lang="fr-FR" sz="2600" dirty="0"/>
+              <a:t>SP.POP.0014.TO : population de moins de 15 ans</a:t>
+            </a:r>
+          </a:p>
+          <a:p>
+            <a:pPr lvl="2"/>
+            <a:endParaRPr lang="fr-FR" sz="2600" dirty="0"/>
+          </a:p>
+          <a:p>
+            <a:pPr lvl="1"/>
+            <a:r>
+              <a:rPr lang="fr-FR" sz="2800" dirty="0"/>
+              <a:t>SP.POP.GROW : taux de croissance démographique</a:t>
+            </a:r>
+          </a:p>
+          <a:p>
+            <a:pPr lvl="1"/>
+            <a:endParaRPr lang="fr-FR" sz="2800" dirty="0"/>
+          </a:p>
+          <a:p>
+            <a:r>
+              <a:rPr lang="fr-FR" sz="2800" b="1" dirty="0"/>
+              <a:t>La situation économique</a:t>
+            </a:r>
+          </a:p>
+          <a:p>
+            <a:pPr lvl="1"/>
+            <a:r>
+              <a:rPr lang="fr-FR" sz="2600" dirty="0"/>
+              <a:t>NY.GDP.PCAP.KD : PNB par habitant</a:t>
+            </a:r>
+          </a:p>
+          <a:p>
+            <a:pPr lvl="1"/>
+            <a:r>
+              <a:rPr lang="fr-FR" sz="2800" dirty="0"/>
+              <a:t>SL.UEM.TOTL.ZS : taux de chômage</a:t>
+            </a:r>
+          </a:p>
+          <a:p>
+            <a:pPr marL="0" indent="0">
+              <a:buNone/>
+            </a:pPr>
+            <a:endParaRPr lang="fr-FR" sz="2800" dirty="0"/>
+          </a:p>
+          <a:p>
+            <a:r>
+              <a:rPr lang="fr-FR" sz="2800" b="1" dirty="0"/>
+              <a:t>Les infrastructures technologiques</a:t>
+            </a:r>
+          </a:p>
+          <a:p>
+            <a:pPr lvl="1"/>
+            <a:r>
+              <a:rPr lang="fr-FR" sz="2800" dirty="0"/>
+              <a:t>IT.NET.USER.P2 : taux d’utilisateurs d’internet</a:t>
+            </a:r>
+          </a:p>
+          <a:p>
+            <a:pPr lvl="1"/>
+            <a:r>
+              <a:rPr lang="fr-FR" sz="2800" dirty="0"/>
+              <a:t>IT.CMP.PCMP.P2 : taux d’équipement en ordinateurs personnels</a:t>
+            </a:r>
+          </a:p>
+          <a:p>
+            <a:endParaRPr lang="fr-FR" dirty="0"/>
+          </a:p>
+          <a:p>
+            <a:pPr lvl="1"/>
+            <a:endParaRPr lang="fr-FR" dirty="0"/>
+          </a:p>
+        </p:txBody>
+      </p:sp>
+    </p:spTree>
+    <p:extLst>
+      <p:ext uri="{BB962C8B-B14F-4D97-AF65-F5344CB8AC3E}">
+        <p14:creationId xmlns:p14="http://schemas.microsoft.com/office/powerpoint/2010/main" val="2428231970"/>
+      </p:ext>
+    </p:extLst>
+  </p:cSld>
+  <p:clrMapOvr>
+    <a:masterClrMapping/>
+  </p:clrMapOvr>
+</p:sld>
+</file>
+
+<file path=ppt/slides/slide13.xml><?xml version="1.0" encoding="utf-8"?>
+<p:sld xmlns:a="http://schemas.openxmlformats.org/drawingml/2006/main" xmlns:r="http://schemas.openxmlformats.org/officeDocument/2006/relationships" xmlns:p="http://schemas.openxmlformats.org/presentationml/2006/main">
+  <p:cSld>
+    <p:spTree>
+      <p:nvGrpSpPr>
+        <p:cNvPr id="1" name=""/>
+        <p:cNvGrpSpPr/>
+        <p:nvPr/>
+      </p:nvGrpSpPr>
+      <p:grpSpPr>
+        <a:xfrm>
+          <a:off x="0" y="0"/>
+          <a:ext cx="0" cy="0"/>
+          <a:chOff x="0" y="0"/>
+          <a:chExt cx="0" cy="0"/>
+        </a:xfrm>
+      </p:grpSpPr>
+      <p:sp>
+        <p:nvSpPr>
+          <p:cNvPr id="2" name="Titre 1">
+            <a:extLst>
+              <a:ext uri="{FF2B5EF4-FFF2-40B4-BE49-F238E27FC236}">
+                <a16:creationId xmlns:a16="http://schemas.microsoft.com/office/drawing/2014/main" id="{86EA0680-0155-4547-B930-7EB1D5711B4E}"/>
+              </a:ext>
+            </a:extLst>
+          </p:cNvPr>
+          <p:cNvSpPr>
+            <a:spLocks noGrp="1"/>
+          </p:cNvSpPr>
+          <p:nvPr>
+            <p:ph type="title"/>
+          </p:nvPr>
+        </p:nvSpPr>
+        <p:spPr>
+          <a:xfrm>
+            <a:off x="2895600" y="207781"/>
+            <a:ext cx="8610600" cy="1293028"/>
+          </a:xfrm>
+        </p:spPr>
+        <p:txBody>
+          <a:bodyPr/>
+          <a:lstStyle/>
+          <a:p>
+            <a:r>
+              <a:rPr lang="fr-FR" dirty="0"/>
+              <a:t>Limites du jeu de données</a:t>
+            </a:r>
+          </a:p>
+        </p:txBody>
+      </p:sp>
+      <p:sp>
+        <p:nvSpPr>
+          <p:cNvPr id="3" name="Espace réservé du contenu 2">
+            <a:extLst>
+              <a:ext uri="{FF2B5EF4-FFF2-40B4-BE49-F238E27FC236}">
+                <a16:creationId xmlns:a16="http://schemas.microsoft.com/office/drawing/2014/main" id="{844B7975-7EF1-4C09-854E-EAD633CFAA50}"/>
+              </a:ext>
+            </a:extLst>
+          </p:cNvPr>
+          <p:cNvSpPr>
+            <a:spLocks noGrp="1"/>
+          </p:cNvSpPr>
+          <p:nvPr>
+            <p:ph idx="1"/>
+          </p:nvPr>
+        </p:nvSpPr>
+        <p:spPr>
+          <a:xfrm>
+            <a:off x="685800" y="1500809"/>
+            <a:ext cx="10820400" cy="5357191"/>
+          </a:xfrm>
+        </p:spPr>
+        <p:txBody>
+          <a:bodyPr>
+            <a:normAutofit lnSpcReduction="10000"/>
+          </a:bodyPr>
+          <a:lstStyle/>
+          <a:p>
+            <a:pPr algn="just"/>
+            <a:r>
+              <a:rPr lang="fr-FR" b="1" dirty="0"/>
+              <a:t>Des données parfois datées </a:t>
+            </a:r>
+            <a:r>
+              <a:rPr lang="fr-FR" dirty="0"/>
+              <a:t>: 2016 en général, mais parfois plus anciennes. </a:t>
+            </a:r>
+          </a:p>
+          <a:p>
+            <a:pPr lvl="1" algn="just"/>
+            <a:r>
+              <a:rPr lang="fr-FR" dirty="0"/>
+              <a:t>Ex. : 2008 pour l’équipement en ordinateur.</a:t>
+            </a:r>
+          </a:p>
+          <a:p>
+            <a:pPr marL="0" indent="0" algn="just">
+              <a:buNone/>
+            </a:pPr>
+            <a:endParaRPr lang="fr-FR" dirty="0"/>
+          </a:p>
+          <a:p>
+            <a:pPr algn="just"/>
+            <a:r>
+              <a:rPr lang="fr-FR" dirty="0"/>
+              <a:t>Manque de données sur:</a:t>
+            </a:r>
+          </a:p>
+          <a:p>
+            <a:pPr lvl="1" algn="just"/>
+            <a:r>
+              <a:rPr lang="fr-FR" b="1" dirty="0"/>
+              <a:t>la situation économique : </a:t>
+            </a:r>
+            <a:r>
+              <a:rPr lang="fr-FR" dirty="0"/>
+              <a:t>croissance du PIB</a:t>
+            </a:r>
+          </a:p>
+          <a:p>
+            <a:pPr lvl="1" algn="just"/>
+            <a:r>
+              <a:rPr lang="fr-FR" b="1" dirty="0"/>
+              <a:t>l’infrastructure technologique. </a:t>
+            </a:r>
+            <a:r>
+              <a:rPr lang="fr-FR" dirty="0"/>
+              <a:t>Ex : débit, équipement tablettes, accès à Internet…</a:t>
+            </a:r>
+          </a:p>
+          <a:p>
+            <a:pPr lvl="1" algn="just"/>
+            <a:r>
+              <a:rPr lang="fr-FR" b="1" dirty="0"/>
+              <a:t>la concurrence locale </a:t>
+            </a:r>
+            <a:r>
+              <a:rPr lang="fr-FR" dirty="0"/>
+              <a:t>éventuelle. Ex : étude du marché</a:t>
+            </a:r>
+          </a:p>
+          <a:p>
+            <a:pPr lvl="1" algn="just"/>
+            <a:r>
+              <a:rPr lang="fr-FR" b="1" dirty="0"/>
+              <a:t>les langues parlées </a:t>
+            </a:r>
+            <a:r>
+              <a:rPr lang="fr-FR" dirty="0"/>
+              <a:t>dans le pays. Ex : pays francophones ou anglophones.</a:t>
+            </a:r>
+          </a:p>
+          <a:p>
+            <a:pPr marL="457200" lvl="1" indent="0" algn="just">
+              <a:buNone/>
+            </a:pPr>
+            <a:endParaRPr lang="fr-FR" dirty="0"/>
+          </a:p>
+          <a:p>
+            <a:pPr marL="0" indent="0" algn="just">
+              <a:buNone/>
+            </a:pPr>
+            <a:r>
+              <a:rPr lang="fr-FR" b="1" dirty="0"/>
+              <a:t>Conclusion : </a:t>
+            </a:r>
+          </a:p>
+          <a:p>
+            <a:pPr algn="just"/>
+            <a:r>
+              <a:rPr lang="fr-FR" dirty="0"/>
+              <a:t>Beaucoup de données</a:t>
+            </a:r>
+          </a:p>
+          <a:p>
+            <a:pPr algn="just"/>
+            <a:r>
+              <a:rPr lang="fr-FR" dirty="0"/>
+              <a:t>Une minorité pertinente</a:t>
+            </a:r>
+          </a:p>
+          <a:p>
+            <a:pPr algn="just"/>
+            <a:r>
+              <a:rPr lang="fr-FR" dirty="0"/>
+              <a:t>Indicateurs pertinents très classiques</a:t>
+            </a:r>
+          </a:p>
+          <a:p>
+            <a:pPr algn="just"/>
+            <a:r>
+              <a:rPr lang="fr-FR" dirty="0"/>
+              <a:t>Nécessité de compléter les données disponibles</a:t>
+            </a:r>
+          </a:p>
+        </p:txBody>
+      </p:sp>
+    </p:spTree>
+    <p:extLst>
+      <p:ext uri="{BB962C8B-B14F-4D97-AF65-F5344CB8AC3E}">
+        <p14:creationId xmlns:p14="http://schemas.microsoft.com/office/powerpoint/2010/main" val="3315547483"/>
+      </p:ext>
+    </p:extLst>
+  </p:cSld>
+  <p:clrMapOvr>
+    <a:masterClrMapping/>
+  </p:clrMapOvr>
+</p:sld>
+</file>
+
+<file path=ppt/slides/slide14.xml><?xml version="1.0" encoding="utf-8"?>
+<p:sld xmlns:a="http://schemas.openxmlformats.org/drawingml/2006/main" xmlns:r="http://schemas.openxmlformats.org/officeDocument/2006/relationships" xmlns:p="http://schemas.openxmlformats.org/presentationml/2006/main">
+  <p:cSld>
+    <p:spTree>
+      <p:nvGrpSpPr>
+        <p:cNvPr id="1" name=""/>
+        <p:cNvGrpSpPr/>
+        <p:nvPr/>
+      </p:nvGrpSpPr>
+      <p:grpSpPr>
+        <a:xfrm>
+          <a:off x="0" y="0"/>
+          <a:ext cx="0" cy="0"/>
+          <a:chOff x="0" y="0"/>
+          <a:chExt cx="0" cy="0"/>
+        </a:xfrm>
+      </p:grpSpPr>
+      <p:sp>
+        <p:nvSpPr>
+          <p:cNvPr id="2" name="Titre 1">
+            <a:extLst>
+              <a:ext uri="{FF2B5EF4-FFF2-40B4-BE49-F238E27FC236}">
                 <a16:creationId xmlns:a16="http://schemas.microsoft.com/office/drawing/2014/main" id="{964011A4-8F80-4EB8-891E-8BB51852960E}"/>
               </a:ext>
             </a:extLst>
@@ -6568,24 +7634,12 @@
               <a:buNone/>
             </a:pPr>
             <a:r>
+              <a:rPr lang="fr-FR" i="1" dirty="0" err="1"/>
+              <a:t>academy</a:t>
+            </a:r>
+            <a:r>
               <a:rPr lang="fr-FR" dirty="0"/>
-              <a:t>Je suis </a:t>
-            </a:r>
-            <a:r>
-              <a:rPr lang="fr-FR" i="1" dirty="0"/>
-              <a:t>Data </a:t>
-            </a:r>
-            <a:r>
-              <a:rPr lang="fr-FR" i="1" dirty="0" err="1"/>
-              <a:t>Scientist</a:t>
-            </a:r>
-            <a:r>
-              <a:rPr lang="fr-FR" i="1" dirty="0"/>
-              <a:t> </a:t>
-            </a:r>
-            <a:r>
-              <a:rPr lang="fr-FR" dirty="0"/>
-              <a:t>dans une </a:t>
+              <a:t> est une </a:t>
             </a:r>
             <a:r>
               <a:rPr lang="fr-FR" b="1" dirty="0"/>
@@ -6597,19 +7651,7 @@
             </a:r>
             <a:r>
               <a:rPr lang="fr-FR" dirty="0"/>
-              <a:t>, nommée </a:t>
-            </a:r>
-            <a:r>
-              <a:rPr lang="fr-FR" i="1" dirty="0" err="1"/>
-              <a:t>Academy</a:t>
-            </a:r>
-            <a:r>
-              <a:rPr lang="fr-FR" i="1" dirty="0"/>
-              <a:t> </a:t>
-            </a:r>
-            <a:r>
-              <a:rPr lang="fr-FR" dirty="0"/>
-              <a:t>qui propose :</a:t>
+              <a:t> qui propose :</a:t>
             </a:r>
           </a:p>
           <a:p>
@@ -6656,7 +7698,7 @@
             </a:pPr>
             <a:r>
               <a:rPr lang="fr-FR" dirty="0"/>
-              <a:t>Mark, mon manager, m’a convié à une réunion pour me présenter le projet d’</a:t>
+              <a:t>Mark, mon manager, m’a présenté le projet d’</a:t>
             </a:r>
             <a:r>
               <a:rPr lang="fr-FR" b="1" dirty="0"/>
@@ -6664,7 +7706,16 @@
             </a:r>
             <a:r>
               <a:rPr lang="fr-FR" dirty="0"/>
-              <a:t> de l’entreprise. Il me confie </a:t>
+              <a:t> de l’entreprise.</a:t>
+            </a:r>
+          </a:p>
+          <a:p>
+            <a:pPr marL="0" indent="0" algn="just">
+              <a:buNone/>
+            </a:pPr>
+            <a:r>
+              <a:rPr lang="fr-FR" dirty="0"/>
+              <a:t>Il me confie </a:t>
             </a:r>
             <a:r>
               <a:rPr lang="fr-FR" b="1" dirty="0"/>
@@ -6687,7 +7738,7 @@
             </a:pPr>
             <a:r>
               <a:rPr lang="fr-FR" dirty="0"/>
-              <a:t>Voici les différentes questions que Mark aimerait explorer, que j’ai notées durant la réunion :</a:t>
+              <a:t>Voici les différentes questions que Mark aimerait explorer :</a:t>
             </a:r>
           </a:p>
           <a:p>
@@ -7031,7 +8082,7 @@
           <p:cNvPr id="2" name="Titre 1">
             <a:extLst>
               <a:ext uri="{FF2B5EF4-FFF2-40B4-BE49-F238E27FC236}">
-                <a16:creationId xmlns:a16="http://schemas.microsoft.com/office/drawing/2014/main" id="{6705E105-9DB5-4433-AC63-434E304D551D}"/>
+                <a16:creationId xmlns:a16="http://schemas.microsoft.com/office/drawing/2014/main" id="{6BE7C0E1-B149-456E-906F-735B9A14F40C}"/>
               </a:ext>
             </a:extLst>
           </p:cNvPr>
@@ -7044,7 +8095,7 @@
         </p:nvSpPr>
         <p:spPr>
           <a:xfrm>
-            <a:off x="2895600" y="0"/>
+            <a:off x="2895600" y="80793"/>
             <a:ext cx="8610600" cy="1293028"/>
           </a:xfrm>
         </p:spPr>
@@ -7053,8 +8104,8 @@
           <a:lstStyle/>
           <a:p>
             <a:r>
-              <a:rPr lang="fr-FR" b="1" dirty="0"/>
-              <a:t>LA MISSION</a:t>
+              <a:rPr lang="fr-FR" dirty="0"/>
+              <a:t>La BDD</a:t>
             </a:r>
           </a:p>
         </p:txBody>
@@ -7064,7 +8115,7 @@
           <p:cNvPr id="3" name="Espace réservé du contenu 2">
             <a:extLst>
               <a:ext uri="{FF2B5EF4-FFF2-40B4-BE49-F238E27FC236}">
-                <a16:creationId xmlns:a16="http://schemas.microsoft.com/office/drawing/2014/main" id="{971D3412-8CC1-4F55-A18D-EE0940EC5A9D}"/>
+                <a16:creationId xmlns:a16="http://schemas.microsoft.com/office/drawing/2014/main" id="{F308DC2A-B557-4810-A542-B0FB1FAE56B2}"/>
               </a:ext>
             </a:extLst>
           </p:cNvPr>
@@ -7077,146 +8128,176 @@
         </p:nvSpPr>
         <p:spPr>
           <a:xfrm>
-            <a:off x="685800" y="1701964"/>
-            <a:ext cx="10820400" cy="3485321"/>
+            <a:off x="685800" y="1464816"/>
+            <a:ext cx="10820400" cy="4753869"/>
           </a:xfrm>
         </p:spPr>
         <p:txBody>
           <a:bodyPr>
-            <a:normAutofit/>
+            <a:normAutofit fontScale="92500" lnSpcReduction="20000"/>
           </a:bodyPr>
           <a:lstStyle/>
           <a:p>
-            <a:pPr marL="342900" indent="-342900" algn="just">
-              <a:buFont typeface="+mj-lt"/>
-              <a:buAutoNum type="arabicPeriod"/>
+            <a:pPr marL="0" indent="0">
+              <a:buNone/>
             </a:pPr>
             <a:r>
-              <a:rPr lang="fr-FR" sz="2000" b="1" dirty="0"/>
-              <a:t>Valider la qualité de ce jeu de données</a:t>
-            </a:r>
-            <a:r>
-              <a:rPr lang="fr-FR" sz="2000" dirty="0"/>
-              <a:t> (comporte-t-il beaucoup de données manquantes, dupliquées ?)</a:t>
-            </a:r>
-          </a:p>
-          <a:p>
-            <a:pPr marL="342900" indent="-342900" algn="just">
-              <a:buFont typeface="+mj-lt"/>
-              <a:buAutoNum type="arabicPeriod"/>
+              <a:rPr lang="fr-FR" b="1" dirty="0"/>
+              <a:t>Différentes tables :</a:t>
+            </a:r>
+          </a:p>
+          <a:p>
+            <a:pPr marL="0" indent="0">
+              <a:buNone/>
             </a:pPr>
-            <a:r>
-              <a:rPr lang="fr-FR" sz="2000" b="1" dirty="0"/>
-              <a:t>Décrire les informations contenues dans le jeu de données</a:t>
-            </a:r>
-            <a:r>
-              <a:rPr lang="fr-FR" sz="2000" dirty="0"/>
-              <a:t> (nombre de colonnes ? nombre de lignes ?)</a:t>
-            </a:r>
-          </a:p>
-          <a:p>
-            <a:pPr marL="342900" indent="-342900" algn="just">
-              <a:buFont typeface="+mj-lt"/>
-              <a:buAutoNum type="arabicPeriod"/>
+            <a:endParaRPr lang="fr-FR" b="1" dirty="0"/>
+          </a:p>
+          <a:p>
+            <a:pPr lvl="1" algn="just"/>
+            <a:r>
+              <a:rPr lang="fr-FR" b="1" dirty="0" err="1"/>
+              <a:t>EdStatsData</a:t>
+            </a:r>
+            <a:endParaRPr lang="fr-FR" b="1" dirty="0"/>
+          </a:p>
+          <a:p>
+            <a:pPr marL="457200" lvl="1" indent="0" algn="just">
+              <a:buNone/>
             </a:pPr>
             <a:r>
-              <a:rPr lang="fr-FR" sz="2000" b="1" dirty="0"/>
-              <a:t>Sélectionner les informations qui semblent pertinentes pour répondre à la problématique</a:t>
-            </a:r>
-            <a:r>
-              <a:rPr lang="fr-FR" sz="2000" dirty="0"/>
-              <a:t> (quelles sont les colonnes contenant des informations qui peuvent être utiles pour répondre à la problématique de l’entreprise ?)</a:t>
-            </a:r>
-          </a:p>
-          <a:p>
-            <a:pPr marL="342900" indent="-342900" algn="just">
-              <a:buFont typeface="+mj-lt"/>
-              <a:buAutoNum type="arabicPeriod"/>
+              <a:rPr lang="fr-FR" b="1" dirty="0"/>
+              <a:t>	</a:t>
+            </a:r>
+            <a:r>
+              <a:rPr lang="fr-FR" dirty="0"/>
+              <a:t>table principale contenant les données</a:t>
+            </a:r>
+          </a:p>
+          <a:p>
+            <a:pPr marL="457200" lvl="1" indent="0" algn="just">
+              <a:buNone/>
             </a:pPr>
-            <a:r>
-              <a:rPr lang="fr-FR" sz="2000" b="1" dirty="0"/>
-              <a:t>Déterminer des ordres de grandeurs des indicateurs statistiques classiques</a:t>
-            </a:r>
-            <a:r>
-              <a:rPr lang="fr-FR" sz="2000" dirty="0"/>
-              <a:t> pour les différentes zones géographiques et pays du monde (moyenne/médiane/écart-type par pays et par continent ou bloc géographique)</a:t>
-            </a:r>
-          </a:p>
-        </p:txBody>
-      </p:sp>
-      <p:sp>
-        <p:nvSpPr>
-          <p:cNvPr id="4" name="ZoneTexte 3">
-            <a:extLst>
-              <a:ext uri="{FF2B5EF4-FFF2-40B4-BE49-F238E27FC236}">
-                <a16:creationId xmlns:a16="http://schemas.microsoft.com/office/drawing/2014/main" id="{A703721A-3000-423A-A0D3-E5571F9A6E20}"/>
-              </a:ext>
-            </a:extLst>
-          </p:cNvPr>
-          <p:cNvSpPr txBox="1"/>
-          <p:nvPr/>
-        </p:nvSpPr>
-        <p:spPr>
-          <a:xfrm>
-            <a:off x="685800" y="5187285"/>
-            <a:ext cx="10820400" cy="1323439"/>
-          </a:xfrm>
-          <a:prstGeom prst="rect">
-            <a:avLst/>
-          </a:prstGeom>
-          <a:solidFill>
-            <a:schemeClr val="accent1">
-              <a:alpha val="32000"/>
-            </a:schemeClr>
-          </a:solidFill>
-          <a:ln>
-            <a:solidFill>
-              <a:schemeClr val="accent1"/>
-            </a:solidFill>
-          </a:ln>
-        </p:spPr>
-        <p:txBody>
-          <a:bodyPr wrap="square" rtlCol="0">
-            <a:spAutoFit/>
-          </a:bodyPr>
-          <a:lstStyle/>
-          <a:p>
-            <a:pPr algn="just"/>
-            <a:r>
-              <a:rPr lang="fr-FR" sz="2000" dirty="0"/>
-              <a:t>Mark : « Ton travail va nous permettre de déterminer si ce jeu de données peut informer les décisions d'ouverture vers de nouveaux pays. On va partager ton analyse avec le </a:t>
-            </a:r>
-            <a:r>
-              <a:rPr lang="fr-FR" sz="2000" i="1" dirty="0" err="1"/>
-              <a:t>board</a:t>
-            </a:r>
-            <a:r>
-              <a:rPr lang="fr-FR" sz="2000" dirty="0"/>
-              <a:t>, alors merci de </a:t>
-            </a:r>
-            <a:r>
-              <a:rPr lang="fr-FR" sz="2000" b="1" dirty="0"/>
-              <a:t>soigner la présentation </a:t>
-            </a:r>
-            <a:r>
-              <a:rPr lang="fr-FR" sz="2000" dirty="0"/>
-              <a:t>et de l'illustrer avec des </a:t>
-            </a:r>
-            <a:r>
-              <a:rPr lang="fr-FR" sz="2000" b="1" dirty="0"/>
-              <a:t>graphiques pertinents et lisibles</a:t>
-            </a:r>
-            <a:r>
-              <a:rPr lang="fr-FR" sz="2000" dirty="0"/>
-              <a:t> ! »</a:t>
-            </a:r>
+            <a:endParaRPr lang="fr-FR" dirty="0"/>
+          </a:p>
+          <a:p>
+            <a:pPr lvl="1" algn="just"/>
+            <a:r>
+              <a:rPr lang="fr-FR" b="1" dirty="0" err="1"/>
+              <a:t>EdStatsCountry</a:t>
+            </a:r>
+            <a:endParaRPr lang="fr-FR" b="1" dirty="0"/>
+          </a:p>
+          <a:p>
+            <a:pPr marL="457200" lvl="1" indent="0" algn="just">
+              <a:buNone/>
+            </a:pPr>
+            <a:r>
+              <a:rPr lang="fr-FR" b="1" dirty="0"/>
+              <a:t>	</a:t>
+            </a:r>
+            <a:r>
+              <a:rPr lang="fr-FR" dirty="0"/>
+              <a:t>informations générales sur les pays</a:t>
+            </a:r>
+          </a:p>
+          <a:p>
+            <a:pPr marL="457200" lvl="1" indent="0" algn="just">
+              <a:buNone/>
+            </a:pPr>
+            <a:endParaRPr lang="fr-FR" b="1" dirty="0"/>
+          </a:p>
+          <a:p>
+            <a:pPr lvl="1" algn="just"/>
+            <a:r>
+              <a:rPr lang="fr-FR" b="1" dirty="0" err="1"/>
+              <a:t>EdStatsCountry-Series</a:t>
+            </a:r>
+            <a:endParaRPr lang="fr-FR" b="1" dirty="0"/>
+          </a:p>
+          <a:p>
+            <a:pPr marL="457200" lvl="1" indent="0" algn="just">
+              <a:buNone/>
+            </a:pPr>
+            <a:r>
+              <a:rPr lang="fr-FR" dirty="0"/>
+              <a:t>	source ou mode de calcul des valeurs de quelques séries (pays/indicateur)</a:t>
+            </a:r>
+          </a:p>
+          <a:p>
+            <a:pPr marL="457200" lvl="1" indent="0" algn="just">
+              <a:buNone/>
+            </a:pPr>
+            <a:endParaRPr lang="fr-FR" dirty="0"/>
+          </a:p>
+          <a:p>
+            <a:pPr lvl="1" algn="just"/>
+            <a:r>
+              <a:rPr lang="fr-FR" b="1" dirty="0" err="1"/>
+              <a:t>EdStatsFootNote</a:t>
+            </a:r>
+            <a:endParaRPr lang="fr-FR" b="1" dirty="0"/>
+          </a:p>
+          <a:p>
+            <a:pPr marL="457200" lvl="1" indent="0" algn="just">
+              <a:buNone/>
+            </a:pPr>
+            <a:r>
+              <a:rPr lang="fr-FR" b="1" dirty="0"/>
+              <a:t>	</a:t>
+            </a:r>
+            <a:r>
+              <a:rPr lang="fr-FR" dirty="0"/>
+              <a:t>informations complémentaires concernant une donnée particulière 	(pays/indicateur/année)</a:t>
+            </a:r>
+          </a:p>
+          <a:p>
+            <a:pPr marL="457200" lvl="1" indent="0" algn="just">
+              <a:buNone/>
+            </a:pPr>
+            <a:endParaRPr lang="fr-FR" dirty="0"/>
+          </a:p>
+          <a:p>
+            <a:pPr lvl="1" algn="just"/>
+            <a:r>
+              <a:rPr lang="fr-FR" b="1" dirty="0" err="1"/>
+              <a:t>EdStatsSeries</a:t>
+            </a:r>
+            <a:endParaRPr lang="fr-FR" dirty="0"/>
+          </a:p>
+          <a:p>
+            <a:pPr marL="457200" lvl="1" indent="0" algn="just">
+              <a:buNone/>
+            </a:pPr>
+            <a:r>
+              <a:rPr lang="fr-FR" dirty="0"/>
+              <a:t>	</a:t>
+            </a:r>
+            <a:r>
+              <a:rPr lang="fr-FR" dirty="0" err="1"/>
+              <a:t>details</a:t>
+            </a:r>
+            <a:r>
+              <a:rPr lang="fr-FR" dirty="0"/>
+              <a:t> concernant les indicateurs : description, source, méthode…</a:t>
+            </a:r>
+          </a:p>
+          <a:p>
+            <a:pPr lvl="1"/>
+            <a:endParaRPr lang="fr-FR" dirty="0"/>
+          </a:p>
+          <a:p>
+            <a:pPr lvl="1"/>
+            <a:endParaRPr lang="fr-FR" dirty="0"/>
+          </a:p>
+          <a:p>
+            <a:endParaRPr lang="fr-FR" dirty="0"/>
           </a:p>
         </p:txBody>
       </p:sp>
     </p:spTree>
     <p:extLst>
       <p:ext uri="{BB962C8B-B14F-4D97-AF65-F5344CB8AC3E}">
-        <p14:creationId xmlns:p14="http://schemas.microsoft.com/office/powerpoint/2010/main" val="2545069334"/>
+        <p14:creationId xmlns:p14="http://schemas.microsoft.com/office/powerpoint/2010/main" val="2768625094"/>
       </p:ext>
     </p:extLst>
   </p:cSld>
@@ -7248,7 +8329,7 @@
           <p:cNvPr id="2" name="Titre 1">
             <a:extLst>
               <a:ext uri="{FF2B5EF4-FFF2-40B4-BE49-F238E27FC236}">
-                <a16:creationId xmlns:a16="http://schemas.microsoft.com/office/drawing/2014/main" id="{1AAB0BFB-BAEB-41CC-AB6A-9726BD9C9C87}"/>
+                <a16:creationId xmlns:a16="http://schemas.microsoft.com/office/drawing/2014/main" id="{D0082922-1F0C-4E00-AECE-AB5985B27F96}"/>
               </a:ext>
             </a:extLst>
           </p:cNvPr>
@@ -7265,13 +8346,9 @@
           <a:lstStyle/>
           <a:p>
             <a:r>
-              <a:rPr lang="fr-FR" b="1" dirty="0"/>
-              <a:t>Livrables attendus</a:t>
-            </a:r>
-            <a:br>
-              <a:rPr lang="fr-FR" b="1" dirty="0"/>
-            </a:br>
-            <a:endParaRPr lang="fr-FR" dirty="0"/>
+              <a:rPr lang="fr-FR" dirty="0"/>
+              <a:t>Les données, en bref</a:t>
+            </a:r>
           </a:p>
         </p:txBody>
       </p:sp>
@@ -7280,7 +8357,7 @@
           <p:cNvPr id="3" name="Espace réservé du contenu 2">
             <a:extLst>
               <a:ext uri="{FF2B5EF4-FFF2-40B4-BE49-F238E27FC236}">
-                <a16:creationId xmlns:a16="http://schemas.microsoft.com/office/drawing/2014/main" id="{A4C1F6B0-61F8-4DD2-8434-A490F051FA4A}"/>
+                <a16:creationId xmlns:a16="http://schemas.microsoft.com/office/drawing/2014/main" id="{DEF746C3-1EC2-49F3-91E7-B616CB6E6E73}"/>
               </a:ext>
             </a:extLst>
           </p:cNvPr>
@@ -7298,27 +8375,60 @@
           <a:p>
             <a:r>
               <a:rPr lang="fr-FR" dirty="0"/>
-              <a:t>Un notebook comportant les analyses pré-exploratoires réalisées (non </a:t>
-            </a:r>
-            <a:r>
-              <a:rPr lang="fr-FR" dirty="0" err="1"/>
-              <a:t>cleané</a:t>
-            </a:r>
+              <a:t>217 pays</a:t>
+            </a:r>
+          </a:p>
+          <a:p>
             <a:r>
               <a:rPr lang="fr-FR" dirty="0"/>
-              <a:t>, pour comprendre votre démarche).</a:t>
-            </a:r>
+              <a:t>3665 indicateurs </a:t>
+            </a:r>
+            <a:r>
+              <a:rPr lang="fr-FR"/>
+              <a:t>et sous-indicateurs</a:t>
+            </a:r>
+            <a:endParaRPr lang="fr-FR" dirty="0"/>
           </a:p>
           <a:p>
             <a:r>
               <a:rPr lang="fr-FR" dirty="0"/>
-              <a:t>Un support de présentation pour la soutenance.</a:t>
+              <a:t>Des sources de données différentes</a:t>
+            </a:r>
+          </a:p>
+          <a:p>
+            <a:r>
+              <a:rPr lang="fr-FR" dirty="0"/>
+              <a:t>Des séries temporelles passées depuis 1970 et jusqu’en 2017…</a:t>
+            </a:r>
+          </a:p>
+          <a:p>
+            <a:r>
+              <a:rPr lang="fr-FR" dirty="0"/>
+              <a:t>… et des projections pour 2020 et jusqu’en 2100</a:t>
             </a:r>
           </a:p>
           <a:p>
             <a:pPr marL="0" indent="0">
               <a:buNone/>
             </a:pPr>
+            <a:endParaRPr lang="fr-FR" dirty="0"/>
+          </a:p>
+          <a:p>
+            <a:pPr marL="0" indent="0">
+              <a:buNone/>
+            </a:pPr>
+            <a:r>
+              <a:rPr lang="fr-FR" b="1" dirty="0"/>
+              <a:t>Mais…</a:t>
+            </a:r>
+          </a:p>
+          <a:p>
+            <a:r>
+              <a:rPr lang="fr-FR" dirty="0"/>
+              <a:t>Taux de remplissage global : 0.8 %</a:t>
+            </a:r>
+          </a:p>
+          <a:p>
             <a:endParaRPr lang="fr-FR" dirty="0"/>
           </a:p>
         </p:txBody>
@@ -7326,7 +8436,7 @@
     </p:spTree>
     <p:extLst>
       <p:ext uri="{BB962C8B-B14F-4D97-AF65-F5344CB8AC3E}">
-        <p14:creationId xmlns:p14="http://schemas.microsoft.com/office/powerpoint/2010/main" val="1324194616"/>
+        <p14:creationId xmlns:p14="http://schemas.microsoft.com/office/powerpoint/2010/main" val="568591842"/>
       </p:ext>
     </p:extLst>
   </p:cSld>
@@ -7358,7 +8468,7 @@
           <p:cNvPr id="2" name="Titre 1">
             <a:extLst>
               <a:ext uri="{FF2B5EF4-FFF2-40B4-BE49-F238E27FC236}">
-                <a16:creationId xmlns:a16="http://schemas.microsoft.com/office/drawing/2014/main" id="{96885828-B058-4F14-80D3-515FB1B2EA26}"/>
+                <a16:creationId xmlns:a16="http://schemas.microsoft.com/office/drawing/2014/main" id="{6705E105-9DB5-4433-AC63-434E304D551D}"/>
               </a:ext>
             </a:extLst>
           </p:cNvPr>
@@ -7369,38 +8479,29 @@
             <p:ph type="title"/>
           </p:nvPr>
         </p:nvSpPr>
-        <p:spPr/>
+        <p:spPr>
+          <a:xfrm>
+            <a:off x="2895600" y="0"/>
+            <a:ext cx="8610600" cy="1293028"/>
+          </a:xfrm>
+        </p:spPr>
         <p:txBody>
           <a:bodyPr/>
           <a:lstStyle/>
           <a:p>
             <a:r>
               <a:rPr lang="fr-FR" b="1" dirty="0"/>
-              <a:t>Partie 2 :</a:t>
-            </a:r>
-            <a:br>
-              <a:rPr lang="fr-FR" b="1" dirty="0"/>
-            </a:br>
-            <a:r>
-              <a:rPr lang="fr-FR" dirty="0"/>
-              <a:t>Présentation de l’analyse </a:t>
-            </a:r>
-            <a:br>
-              <a:rPr lang="fr-FR" dirty="0"/>
-            </a:br>
-            <a:r>
-              <a:rPr lang="fr-FR" dirty="0"/>
-              <a:t>pré-exploratoire </a:t>
-            </a:r>
-          </a:p>
-        </p:txBody>
-      </p:sp>
-      <p:sp>
-        <p:nvSpPr>
-          <p:cNvPr id="3" name="Espace réservé du texte 2">
+              <a:t>LA MISSION</a:t>
+            </a:r>
+          </a:p>
+        </p:txBody>
+      </p:sp>
+      <p:sp>
+        <p:nvSpPr>
+          <p:cNvPr id="3" name="Espace réservé du contenu 2">
             <a:extLst>
               <a:ext uri="{FF2B5EF4-FFF2-40B4-BE49-F238E27FC236}">
-                <a16:creationId xmlns:a16="http://schemas.microsoft.com/office/drawing/2014/main" id="{C1CD7A5C-6044-4F77-841E-E28AF461363D}"/>
+                <a16:creationId xmlns:a16="http://schemas.microsoft.com/office/drawing/2014/main" id="{971D3412-8CC1-4F55-A18D-EE0940EC5A9D}"/>
               </a:ext>
             </a:extLst>
           </p:cNvPr>
@@ -7408,25 +8509,173 @@
             <a:spLocks noGrp="1"/>
           </p:cNvSpPr>
           <p:nvPr>
-            <p:ph type="body" idx="1"/>
-          </p:nvPr>
-        </p:nvSpPr>
-        <p:spPr/>
-        <p:txBody>
-          <a:bodyPr/>
-          <a:lstStyle/>
-          <a:p>
-            <a:br>
-              <a:rPr lang="fr-FR" dirty="0"/>
-            </a:br>
-            <a:endParaRPr lang="fr-FR" dirty="0"/>
+            <p:ph idx="1"/>
+          </p:nvPr>
+        </p:nvSpPr>
+        <p:spPr>
+          <a:xfrm>
+            <a:off x="685800" y="1701964"/>
+            <a:ext cx="10820400" cy="3485321"/>
+          </a:xfrm>
+        </p:spPr>
+        <p:txBody>
+          <a:bodyPr>
+            <a:normAutofit/>
+          </a:bodyPr>
+          <a:lstStyle/>
+          <a:p>
+            <a:pPr marL="342900" indent="-342900" algn="just">
+              <a:buFont typeface="+mj-lt"/>
+              <a:buAutoNum type="arabicPeriod"/>
+            </a:pPr>
+            <a:endParaRPr lang="fr-FR" sz="2000" b="1" dirty="0"/>
+          </a:p>
+          <a:p>
+            <a:pPr marL="342900" indent="-342900" algn="just">
+              <a:buFont typeface="+mj-lt"/>
+              <a:buAutoNum type="arabicPeriod"/>
+            </a:pPr>
+            <a:endParaRPr lang="fr-FR" sz="2000" b="1" dirty="0"/>
+          </a:p>
+          <a:p>
+            <a:pPr marL="342900" indent="-342900" algn="just">
+              <a:buFont typeface="+mj-lt"/>
+              <a:buAutoNum type="arabicPeriod"/>
+            </a:pPr>
+            <a:r>
+              <a:rPr lang="fr-FR" sz="2000" b="1" dirty="0"/>
+              <a:t>Valider la qualité </a:t>
+            </a:r>
+            <a:r>
+              <a:rPr lang="fr-FR" sz="2000" dirty="0"/>
+              <a:t>de ce jeu de données</a:t>
+            </a:r>
+          </a:p>
+          <a:p>
+            <a:pPr marL="342900" indent="-342900" algn="just">
+              <a:buFont typeface="+mj-lt"/>
+              <a:buAutoNum type="arabicPeriod"/>
+            </a:pPr>
+            <a:r>
+              <a:rPr lang="fr-FR" sz="2000" b="1" dirty="0"/>
+              <a:t>Décrire les informations </a:t>
+            </a:r>
+            <a:r>
+              <a:rPr lang="fr-FR" sz="2000" dirty="0"/>
+              <a:t>contenues dans le jeu de données</a:t>
+            </a:r>
+          </a:p>
+          <a:p>
+            <a:pPr marL="342900" indent="-342900" algn="just">
+              <a:buFont typeface="+mj-lt"/>
+              <a:buAutoNum type="arabicPeriod"/>
+            </a:pPr>
+            <a:r>
+              <a:rPr lang="fr-FR" sz="2000" b="1" dirty="0"/>
+              <a:t>Sélectionner les informations </a:t>
+            </a:r>
+            <a:r>
+              <a:rPr lang="fr-FR" sz="2000" dirty="0"/>
+              <a:t>qui semblent pertinentes</a:t>
+            </a:r>
+          </a:p>
+          <a:p>
+            <a:pPr marL="342900" indent="-342900" algn="just">
+              <a:buFont typeface="+mj-lt"/>
+              <a:buAutoNum type="arabicPeriod"/>
+            </a:pPr>
+            <a:r>
+              <a:rPr lang="fr-FR" sz="2000" b="1" dirty="0"/>
+              <a:t>Déterminer des ordres de grandeurs </a:t>
+            </a:r>
+            <a:r>
+              <a:rPr lang="fr-FR" sz="2000" dirty="0"/>
+              <a:t>des indicateurs statistiques classiques</a:t>
+            </a:r>
+          </a:p>
+        </p:txBody>
+      </p:sp>
+      <p:sp>
+        <p:nvSpPr>
+          <p:cNvPr id="4" name="ZoneTexte 3">
+            <a:extLst>
+              <a:ext uri="{FF2B5EF4-FFF2-40B4-BE49-F238E27FC236}">
+                <a16:creationId xmlns:a16="http://schemas.microsoft.com/office/drawing/2014/main" id="{A703721A-3000-423A-A0D3-E5571F9A6E20}"/>
+              </a:ext>
+            </a:extLst>
+          </p:cNvPr>
+          <p:cNvSpPr txBox="1"/>
+          <p:nvPr/>
+        </p:nvSpPr>
+        <p:spPr>
+          <a:xfrm>
+            <a:off x="685800" y="4494316"/>
+            <a:ext cx="10820400" cy="1323439"/>
+          </a:xfrm>
+          <a:prstGeom prst="rect">
+            <a:avLst/>
+          </a:prstGeom>
+          <a:solidFill>
+            <a:schemeClr val="accent1">
+              <a:alpha val="32000"/>
+            </a:schemeClr>
+          </a:solidFill>
+          <a:ln>
+            <a:solidFill>
+              <a:schemeClr val="accent1"/>
+            </a:solidFill>
+          </a:ln>
+        </p:spPr>
+        <p:txBody>
+          <a:bodyPr wrap="square" rtlCol="0">
+            <a:spAutoFit/>
+          </a:bodyPr>
+          <a:lstStyle/>
+          <a:p>
+            <a:pPr algn="just"/>
+            <a:r>
+              <a:rPr lang="fr-FR" sz="2000" dirty="0"/>
+              <a:t>Mark : « Ton travail va nous permettre de déterminer si ce jeu de données peut </a:t>
+            </a:r>
+            <a:r>
+              <a:rPr lang="fr-FR" sz="2000" b="1" dirty="0"/>
+              <a:t>informer les décisions </a:t>
+            </a:r>
+            <a:r>
+              <a:rPr lang="fr-FR" sz="2000" dirty="0"/>
+              <a:t>d'ouverture vers de nouveaux pays. On va partager ton analyse avec le </a:t>
+            </a:r>
+            <a:r>
+              <a:rPr lang="fr-FR" sz="2000" i="1" dirty="0" err="1"/>
+              <a:t>board</a:t>
+            </a:r>
+            <a:r>
+              <a:rPr lang="fr-FR" sz="2000" dirty="0"/>
+              <a:t>, alors merci de </a:t>
+            </a:r>
+            <a:r>
+              <a:rPr lang="fr-FR" sz="2000" b="1" dirty="0"/>
+              <a:t>soigner la présentation </a:t>
+            </a:r>
+            <a:r>
+              <a:rPr lang="fr-FR" sz="2000" dirty="0"/>
+              <a:t>et de l'illustrer avec des </a:t>
+            </a:r>
+            <a:r>
+              <a:rPr lang="fr-FR" sz="2000" b="1" dirty="0"/>
+              <a:t>graphiques pertinents et lisibles</a:t>
+            </a:r>
+            <a:r>
+              <a:rPr lang="fr-FR" sz="2000" dirty="0"/>
+              <a:t> ! »</a:t>
+            </a:r>
           </a:p>
         </p:txBody>
       </p:sp>
     </p:spTree>
     <p:extLst>
       <p:ext uri="{BB962C8B-B14F-4D97-AF65-F5344CB8AC3E}">
-        <p14:creationId xmlns:p14="http://schemas.microsoft.com/office/powerpoint/2010/main" val="3303506237"/>
+        <p14:creationId xmlns:p14="http://schemas.microsoft.com/office/powerpoint/2010/main" val="2545069334"/>
       </p:ext>
     </p:extLst>
   </p:cSld>
@@ -7458,7 +8707,7 @@
           <p:cNvPr id="2" name="Titre 1">
             <a:extLst>
               <a:ext uri="{FF2B5EF4-FFF2-40B4-BE49-F238E27FC236}">
-                <a16:creationId xmlns:a16="http://schemas.microsoft.com/office/drawing/2014/main" id="{96885828-B058-4F14-80D3-515FB1B2EA26}"/>
+                <a16:creationId xmlns:a16="http://schemas.microsoft.com/office/drawing/2014/main" id="{1AAB0BFB-BAEB-41CC-AB6A-9726BD9C9C87}"/>
               </a:ext>
             </a:extLst>
           </p:cNvPr>
@@ -7476,17 +8725,21 @@
           <a:p>
             <a:r>
               <a:rPr lang="fr-FR" b="1" dirty="0"/>
-              <a:t>conclusions sur la pertinence de l’usage du jeu de données</a:t>
-            </a:r>
-          </a:p>
-        </p:txBody>
-      </p:sp>
-      <p:sp>
-        <p:nvSpPr>
-          <p:cNvPr id="3" name="Espace réservé du texte 2">
+              <a:t>Livrables attendus</a:t>
+            </a:r>
+            <a:br>
+              <a:rPr lang="fr-FR" b="1" dirty="0"/>
+            </a:br>
+            <a:endParaRPr lang="fr-FR" dirty="0"/>
+          </a:p>
+        </p:txBody>
+      </p:sp>
+      <p:sp>
+        <p:nvSpPr>
+          <p:cNvPr id="3" name="Espace réservé du contenu 2">
             <a:extLst>
               <a:ext uri="{FF2B5EF4-FFF2-40B4-BE49-F238E27FC236}">
-                <a16:creationId xmlns:a16="http://schemas.microsoft.com/office/drawing/2014/main" id="{C1CD7A5C-6044-4F77-841E-E28AF461363D}"/>
+                <a16:creationId xmlns:a16="http://schemas.microsoft.com/office/drawing/2014/main" id="{A4C1F6B0-61F8-4DD2-8434-A490F051FA4A}"/>
               </a:ext>
             </a:extLst>
           </p:cNvPr>
@@ -7494,7 +8747,7 @@
             <a:spLocks noGrp="1"/>
           </p:cNvSpPr>
           <p:nvPr>
-            <p:ph type="body" idx="1"/>
+            <p:ph idx="1"/>
           </p:nvPr>
         </p:nvSpPr>
         <p:spPr/>
@@ -7502,9 +8755,29 @@
           <a:bodyPr/>
           <a:lstStyle/>
           <a:p>
-            <a:br>
+            <a:r>
               <a:rPr lang="fr-FR" dirty="0"/>
-            </a:br>
+              <a:t>Un notebook comportant les analyses pré-exploratoires réalisées (non </a:t>
+            </a:r>
+            <a:r>
+              <a:rPr lang="fr-FR" dirty="0" err="1"/>
+              <a:t>cleané</a:t>
+            </a:r>
+            <a:r>
+              <a:rPr lang="fr-FR" dirty="0"/>
+              <a:t>, pour comprendre votre démarche).</a:t>
+            </a:r>
+          </a:p>
+          <a:p>
+            <a:r>
+              <a:rPr lang="fr-FR" dirty="0"/>
+              <a:t>Un support de présentation pour la soutenance.</a:t>
+            </a:r>
+          </a:p>
+          <a:p>
+            <a:pPr marL="0" indent="0">
+              <a:buNone/>
+            </a:pPr>
             <a:endParaRPr lang="fr-FR" dirty="0"/>
           </a:p>
         </p:txBody>
@@ -7512,7 +8785,7 @@
     </p:spTree>
     <p:extLst>
       <p:ext uri="{BB962C8B-B14F-4D97-AF65-F5344CB8AC3E}">
-        <p14:creationId xmlns:p14="http://schemas.microsoft.com/office/powerpoint/2010/main" val="578457273"/>
+        <p14:creationId xmlns:p14="http://schemas.microsoft.com/office/powerpoint/2010/main" val="1324194616"/>
       </p:ext>
     </p:extLst>
   </p:cSld>

</xml_diff>